<commit_message>
delete problem title in ppt
</commit_message>
<xml_diff>
--- a/ppt/2022-6-4.pptx
+++ b/ppt/2022-6-4.pptx
@@ -4881,13 +4881,6 @@
             <a:r>
               <a:rPr lang="zh-CN" altLang="en-US" sz="3200" dirty="0"/>
               <a:t> 完成情况</a:t>
-            </a:r>
-            <a:endParaRPr lang="en-US" altLang="zh-CN" sz="3200" dirty="0"/>
-          </a:p>
-          <a:p>
-            <a:r>
-              <a:rPr lang="zh-CN" altLang="en-US" sz="3200" dirty="0"/>
-              <a:t>遇到的困难</a:t>
             </a:r>
             <a:endParaRPr lang="en-US" altLang="zh-CN" sz="3200" dirty="0"/>
           </a:p>

</xml_diff>

<commit_message>
Update ppt regarding ipc-bench result
</commit_message>
<xml_diff>
--- a/ppt/2022-6-4.pptx
+++ b/ppt/2022-6-4.pptx
@@ -5,17 +5,20 @@
     <p:sldMasterId id="2147483648" r:id="rId1"/>
   </p:sldMasterIdLst>
   <p:notesMasterIdLst>
-    <p:notesMasterId r:id="rId10"/>
+    <p:notesMasterId r:id="rId4"/>
   </p:notesMasterIdLst>
   <p:sldIdLst>
-    <p:sldId id="279" r:id="rId2"/>
-    <p:sldId id="340" r:id="rId3"/>
-    <p:sldId id="419" r:id="rId4"/>
-    <p:sldId id="441" r:id="rId5"/>
-    <p:sldId id="449" r:id="rId6"/>
-    <p:sldId id="453" r:id="rId7"/>
-    <p:sldId id="437" r:id="rId8"/>
-    <p:sldId id="314" r:id="rId9"/>
+    <p:sldId id="279" r:id="rId3"/>
+    <p:sldId id="340" r:id="rId5"/>
+    <p:sldId id="419" r:id="rId6"/>
+    <p:sldId id="441" r:id="rId7"/>
+    <p:sldId id="449" r:id="rId8"/>
+    <p:sldId id="453" r:id="rId9"/>
+    <p:sldId id="456" r:id="rId10"/>
+    <p:sldId id="457" r:id="rId11"/>
+    <p:sldId id="458" r:id="rId12"/>
+    <p:sldId id="437" r:id="rId13"/>
+    <p:sldId id="314" r:id="rId14"/>
   </p:sldIdLst>
   <p:sldSz cx="12192000" cy="6858000"/>
   <p:notesSz cx="6858000" cy="9144000"/>
@@ -127,28 +130,12 @@
             <p14:sldId id="453"/>
             <p14:sldId id="437"/>
             <p14:sldId id="314"/>
+            <p14:sldId id="456"/>
+            <p14:sldId id="457"/>
+            <p14:sldId id="458"/>
           </p14:sldIdLst>
         </p14:section>
       </p14:sectionLst>
-    </p:ext>
-    <p:ext uri="{EFAFB233-063F-42B5-8137-9DF3F51BA10A}">
-      <p15:sldGuideLst xmlns:p15="http://schemas.microsoft.com/office/powerpoint/2012/main">
-        <p15:guide id="1" orient="horz" pos="1134">
-          <p15:clr>
-            <a:srgbClr val="A4A3A4"/>
-          </p15:clr>
-        </p15:guide>
-        <p15:guide id="2" pos="702">
-          <p15:clr>
-            <a:srgbClr val="A4A3A4"/>
-          </p15:clr>
-        </p15:guide>
-        <p15:guide id="3" pos="6947">
-          <p15:clr>
-            <a:srgbClr val="A4A3A4"/>
-          </p15:clr>
-        </p15:guide>
-      </p15:sldGuideLst>
     </p:ext>
   </p:extLst>
 </p:presentation>
@@ -242,7 +229,6 @@
           <a:p>
             <a:fld id="{DE75668F-B37B-164D-A62C-3FF5A8BC808F}" type="datetimeFigureOut">
               <a:rPr lang="en-US" smtClean="0"/>
-              <a:t>6/3/22</a:t>
             </a:fld>
             <a:endParaRPr lang="en-US"/>
           </a:p>
@@ -309,6 +295,7 @@
               <a:rPr lang="en-US" altLang="zh-CN"/>
               <a:t>Click to edit Master text styles</a:t>
             </a:r>
+            <a:endParaRPr lang="en-US" altLang="zh-CN"/>
           </a:p>
           <a:p>
             <a:pPr lvl="1"/>
@@ -316,6 +303,7 @@
               <a:rPr lang="en-US" altLang="zh-CN"/>
               <a:t>Second level</a:t>
             </a:r>
+            <a:endParaRPr lang="en-US" altLang="zh-CN"/>
           </a:p>
           <a:p>
             <a:pPr lvl="2"/>
@@ -323,6 +311,7 @@
               <a:rPr lang="en-US" altLang="zh-CN"/>
               <a:t>Third level</a:t>
             </a:r>
+            <a:endParaRPr lang="en-US" altLang="zh-CN"/>
           </a:p>
           <a:p>
             <a:pPr lvl="3"/>
@@ -330,6 +319,7 @@
               <a:rPr lang="en-US" altLang="zh-CN"/>
               <a:t>Fourth level</a:t>
             </a:r>
+            <a:endParaRPr lang="en-US" altLang="zh-CN"/>
           </a:p>
           <a:p>
             <a:pPr lvl="4"/>
@@ -401,7 +391,6 @@
           <a:p>
             <a:fld id="{09FAC59A-2554-7441-A138-FBAFD49FADCF}" type="slidenum">
               <a:rPr lang="en-US" smtClean="0"/>
-              <a:t>‹#›</a:t>
             </a:fld>
             <a:endParaRPr lang="en-US"/>
           </a:p>
@@ -591,7 +580,172 @@
           <a:p>
             <a:fld id="{09FAC59A-2554-7441-A138-FBAFD49FADCF}" type="slidenum">
               <a:rPr lang="en-US" smtClean="0"/>
-              <a:t>1</a:t>
+            </a:fld>
+            <a:endParaRPr lang="en-US"/>
+          </a:p>
+        </p:txBody>
+      </p:sp>
+    </p:spTree>
+  </p:cSld>
+  <p:clrMapOvr>
+    <a:masterClrMapping/>
+  </p:clrMapOvr>
+</p:notes>
+</file>
+
+<file path=ppt/notesSlides/notesSlide10.xml><?xml version="1.0" encoding="utf-8"?>
+<p:notes xmlns:a="http://schemas.openxmlformats.org/drawingml/2006/main" xmlns:r="http://schemas.openxmlformats.org/officeDocument/2006/relationships" xmlns:p="http://schemas.openxmlformats.org/presentationml/2006/main">
+  <p:cSld>
+    <p:spTree>
+      <p:nvGrpSpPr>
+        <p:cNvPr id="1" name=""/>
+        <p:cNvGrpSpPr/>
+        <p:nvPr/>
+      </p:nvGrpSpPr>
+      <p:grpSpPr>
+        <a:xfrm>
+          <a:off x="0" y="0"/>
+          <a:ext cx="0" cy="0"/>
+          <a:chOff x="0" y="0"/>
+          <a:chExt cx="0" cy="0"/>
+        </a:xfrm>
+      </p:grpSpPr>
+      <p:sp>
+        <p:nvSpPr>
+          <p:cNvPr id="2" name="幻灯片图像占位符 1"/>
+          <p:cNvSpPr>
+            <a:spLocks noGrp="1" noRot="1" noChangeAspect="1"/>
+          </p:cNvSpPr>
+          <p:nvPr>
+            <p:ph type="sldImg"/>
+          </p:nvPr>
+        </p:nvSpPr>
+        <p:spPr>
+          <a:xfrm>
+            <a:off x="685800" y="1143000"/>
+            <a:ext cx="5486400" cy="3086100"/>
+          </a:xfrm>
+        </p:spPr>
+      </p:sp>
+      <p:sp>
+        <p:nvSpPr>
+          <p:cNvPr id="3" name="备注占位符 2"/>
+          <p:cNvSpPr>
+            <a:spLocks noGrp="1"/>
+          </p:cNvSpPr>
+          <p:nvPr>
+            <p:ph type="body" idx="1"/>
+          </p:nvPr>
+        </p:nvSpPr>
+        <p:spPr/>
+        <p:txBody>
+          <a:bodyPr/>
+          <a:lstStyle/>
+          <a:p>
+            <a:endParaRPr lang="en-US" altLang="zh-CN" sz="2400" dirty="0"/>
+          </a:p>
+        </p:txBody>
+      </p:sp>
+      <p:sp>
+        <p:nvSpPr>
+          <p:cNvPr id="4" name="幻灯片编号占位符 3"/>
+          <p:cNvSpPr>
+            <a:spLocks noGrp="1"/>
+          </p:cNvSpPr>
+          <p:nvPr>
+            <p:ph type="sldNum" sz="quarter" idx="10"/>
+          </p:nvPr>
+        </p:nvSpPr>
+        <p:spPr/>
+        <p:txBody>
+          <a:bodyPr/>
+          <a:lstStyle/>
+          <a:p>
+            <a:fld id="{09FAC59A-2554-7441-A138-FBAFD49FADCF}" type="slidenum">
+              <a:rPr lang="en-US" smtClean="0"/>
+            </a:fld>
+            <a:endParaRPr lang="en-US"/>
+          </a:p>
+        </p:txBody>
+      </p:sp>
+    </p:spTree>
+  </p:cSld>
+  <p:clrMapOvr>
+    <a:masterClrMapping/>
+  </p:clrMapOvr>
+</p:notes>
+</file>
+
+<file path=ppt/notesSlides/notesSlide11.xml><?xml version="1.0" encoding="utf-8"?>
+<p:notes xmlns:a="http://schemas.openxmlformats.org/drawingml/2006/main" xmlns:r="http://schemas.openxmlformats.org/officeDocument/2006/relationships" xmlns:p="http://schemas.openxmlformats.org/presentationml/2006/main">
+  <p:cSld>
+    <p:spTree>
+      <p:nvGrpSpPr>
+        <p:cNvPr id="1" name=""/>
+        <p:cNvGrpSpPr/>
+        <p:nvPr/>
+      </p:nvGrpSpPr>
+      <p:grpSpPr>
+        <a:xfrm>
+          <a:off x="0" y="0"/>
+          <a:ext cx="0" cy="0"/>
+          <a:chOff x="0" y="0"/>
+          <a:chExt cx="0" cy="0"/>
+        </a:xfrm>
+      </p:grpSpPr>
+      <p:sp>
+        <p:nvSpPr>
+          <p:cNvPr id="2" name="幻灯片图像占位符 1"/>
+          <p:cNvSpPr>
+            <a:spLocks noGrp="1" noRot="1" noChangeAspect="1"/>
+          </p:cNvSpPr>
+          <p:nvPr>
+            <p:ph type="sldImg"/>
+          </p:nvPr>
+        </p:nvSpPr>
+        <p:spPr>
+          <a:xfrm>
+            <a:off x="685800" y="1143000"/>
+            <a:ext cx="5486400" cy="3086100"/>
+          </a:xfrm>
+        </p:spPr>
+      </p:sp>
+      <p:sp>
+        <p:nvSpPr>
+          <p:cNvPr id="3" name="备注占位符 2"/>
+          <p:cNvSpPr>
+            <a:spLocks noGrp="1"/>
+          </p:cNvSpPr>
+          <p:nvPr>
+            <p:ph type="body" idx="1"/>
+          </p:nvPr>
+        </p:nvSpPr>
+        <p:spPr/>
+        <p:txBody>
+          <a:bodyPr/>
+          <a:lstStyle/>
+          <a:p>
+            <a:endParaRPr kumimoji="1" lang="zh-CN" altLang="en-US" sz="2400" dirty="0"/>
+          </a:p>
+        </p:txBody>
+      </p:sp>
+      <p:sp>
+        <p:nvSpPr>
+          <p:cNvPr id="4" name="幻灯片编号占位符 3"/>
+          <p:cNvSpPr>
+            <a:spLocks noGrp="1"/>
+          </p:cNvSpPr>
+          <p:nvPr>
+            <p:ph type="sldNum" sz="quarter" idx="10"/>
+          </p:nvPr>
+        </p:nvSpPr>
+        <p:spPr/>
+        <p:txBody>
+          <a:bodyPr/>
+          <a:lstStyle/>
+          <a:p>
+            <a:fld id="{09FAC59A-2554-7441-A138-FBAFD49FADCF}" type="slidenum">
+              <a:rPr lang="en-US" smtClean="0"/>
             </a:fld>
             <a:endParaRPr lang="en-US"/>
           </a:p>
@@ -675,7 +829,6 @@
           <a:p>
             <a:fld id="{09FAC59A-2554-7441-A138-FBAFD49FADCF}" type="slidenum">
               <a:rPr lang="en-US" smtClean="0"/>
-              <a:t>2</a:t>
             </a:fld>
             <a:endParaRPr lang="en-US"/>
           </a:p>
@@ -759,7 +912,6 @@
           <a:p>
             <a:fld id="{09FAC59A-2554-7441-A138-FBAFD49FADCF}" type="slidenum">
               <a:rPr lang="en-US" smtClean="0"/>
-              <a:t>3</a:t>
             </a:fld>
             <a:endParaRPr lang="en-US"/>
           </a:p>
@@ -843,7 +995,6 @@
           <a:p>
             <a:fld id="{09FAC59A-2554-7441-A138-FBAFD49FADCF}" type="slidenum">
               <a:rPr lang="en-US" smtClean="0"/>
-              <a:t>4</a:t>
             </a:fld>
             <a:endParaRPr lang="en-US"/>
           </a:p>
@@ -927,7 +1078,6 @@
           <a:p>
             <a:fld id="{09FAC59A-2554-7441-A138-FBAFD49FADCF}" type="slidenum">
               <a:rPr lang="en-US" smtClean="0"/>
-              <a:t>5</a:t>
             </a:fld>
             <a:endParaRPr lang="en-US"/>
           </a:p>
@@ -1011,7 +1161,6 @@
           <a:p>
             <a:fld id="{09FAC59A-2554-7441-A138-FBAFD49FADCF}" type="slidenum">
               <a:rPr lang="en-US" smtClean="0"/>
-              <a:t>6</a:t>
             </a:fld>
             <a:endParaRPr lang="en-US"/>
           </a:p>
@@ -1095,7 +1244,6 @@
           <a:p>
             <a:fld id="{09FAC59A-2554-7441-A138-FBAFD49FADCF}" type="slidenum">
               <a:rPr lang="en-US" smtClean="0"/>
-              <a:t>7</a:t>
             </a:fld>
             <a:endParaRPr lang="en-US"/>
           </a:p>
@@ -1158,7 +1306,7 @@
           <a:bodyPr/>
           <a:lstStyle/>
           <a:p>
-            <a:endParaRPr kumimoji="1" lang="zh-CN" altLang="en-US" sz="2400" dirty="0"/>
+            <a:endParaRPr lang="en-US" altLang="zh-CN" sz="2400" dirty="0"/>
           </a:p>
         </p:txBody>
       </p:sp>
@@ -1179,7 +1327,89 @@
           <a:p>
             <a:fld id="{09FAC59A-2554-7441-A138-FBAFD49FADCF}" type="slidenum">
               <a:rPr lang="en-US" smtClean="0"/>
-              <a:t>8</a:t>
+            </a:fld>
+            <a:endParaRPr lang="en-US"/>
+          </a:p>
+        </p:txBody>
+      </p:sp>
+    </p:spTree>
+  </p:cSld>
+  <p:clrMapOvr>
+    <a:masterClrMapping/>
+  </p:clrMapOvr>
+</p:notes>
+</file>
+
+<file path=ppt/notesSlides/notesSlide9.xml><?xml version="1.0" encoding="utf-8"?>
+<p:notes xmlns:a="http://schemas.openxmlformats.org/drawingml/2006/main" xmlns:r="http://schemas.openxmlformats.org/officeDocument/2006/relationships" xmlns:p="http://schemas.openxmlformats.org/presentationml/2006/main">
+  <p:cSld>
+    <p:spTree>
+      <p:nvGrpSpPr>
+        <p:cNvPr id="1" name=""/>
+        <p:cNvGrpSpPr/>
+        <p:nvPr/>
+      </p:nvGrpSpPr>
+      <p:grpSpPr>
+        <a:xfrm>
+          <a:off x="0" y="0"/>
+          <a:ext cx="0" cy="0"/>
+          <a:chOff x="0" y="0"/>
+          <a:chExt cx="0" cy="0"/>
+        </a:xfrm>
+      </p:grpSpPr>
+      <p:sp>
+        <p:nvSpPr>
+          <p:cNvPr id="2" name="幻灯片图像占位符 1"/>
+          <p:cNvSpPr>
+            <a:spLocks noGrp="1" noRot="1" noChangeAspect="1"/>
+          </p:cNvSpPr>
+          <p:nvPr>
+            <p:ph type="sldImg"/>
+          </p:nvPr>
+        </p:nvSpPr>
+        <p:spPr>
+          <a:xfrm>
+            <a:off x="685800" y="1143000"/>
+            <a:ext cx="5486400" cy="3086100"/>
+          </a:xfrm>
+        </p:spPr>
+      </p:sp>
+      <p:sp>
+        <p:nvSpPr>
+          <p:cNvPr id="3" name="备注占位符 2"/>
+          <p:cNvSpPr>
+            <a:spLocks noGrp="1"/>
+          </p:cNvSpPr>
+          <p:nvPr>
+            <p:ph type="body" idx="1"/>
+          </p:nvPr>
+        </p:nvSpPr>
+        <p:spPr/>
+        <p:txBody>
+          <a:bodyPr/>
+          <a:lstStyle/>
+          <a:p>
+            <a:endParaRPr lang="en-US" altLang="zh-CN" sz="2400" dirty="0"/>
+          </a:p>
+        </p:txBody>
+      </p:sp>
+      <p:sp>
+        <p:nvSpPr>
+          <p:cNvPr id="4" name="幻灯片编号占位符 3"/>
+          <p:cNvSpPr>
+            <a:spLocks noGrp="1"/>
+          </p:cNvSpPr>
+          <p:nvPr>
+            <p:ph type="sldNum" sz="quarter" idx="10"/>
+          </p:nvPr>
+        </p:nvSpPr>
+        <p:spPr/>
+        <p:txBody>
+          <a:bodyPr/>
+          <a:lstStyle/>
+          <a:p>
+            <a:fld id="{09FAC59A-2554-7441-A138-FBAFD49FADCF}" type="slidenum">
+              <a:rPr lang="en-US" smtClean="0"/>
             </a:fld>
             <a:endParaRPr lang="en-US"/>
           </a:p>
@@ -1324,7 +1554,6 @@
           <a:p>
             <a:fld id="{CE875574-B30F-E946-8A30-5D40B09C42BE}" type="datetimeFigureOut">
               <a:rPr lang="en-US" smtClean="0"/>
-              <a:t>6/3/22</a:t>
             </a:fld>
             <a:endParaRPr lang="en-US"/>
           </a:p>
@@ -1366,7 +1595,6 @@
           <a:p>
             <a:fld id="{671D2AD8-20DD-1F43-B782-FEE6429B9542}" type="slidenum">
               <a:rPr lang="en-US" smtClean="0"/>
-              <a:t>‹#›</a:t>
             </a:fld>
             <a:endParaRPr lang="en-US"/>
           </a:p>
@@ -1440,6 +1668,7 @@
               <a:rPr lang="zh-CN" altLang="en-US"/>
               <a:t>单击此处编辑母版文本样式</a:t>
             </a:r>
+            <a:endParaRPr lang="zh-CN" altLang="en-US"/>
           </a:p>
           <a:p>
             <a:pPr lvl="1"/>
@@ -1447,6 +1676,7 @@
               <a:rPr lang="zh-CN" altLang="en-US"/>
               <a:t>二级</a:t>
             </a:r>
+            <a:endParaRPr lang="zh-CN" altLang="en-US"/>
           </a:p>
           <a:p>
             <a:pPr lvl="2"/>
@@ -1454,6 +1684,7 @@
               <a:rPr lang="zh-CN" altLang="en-US"/>
               <a:t>三级</a:t>
             </a:r>
+            <a:endParaRPr lang="zh-CN" altLang="en-US"/>
           </a:p>
           <a:p>
             <a:pPr lvl="3"/>
@@ -1461,6 +1692,7 @@
               <a:rPr lang="zh-CN" altLang="en-US"/>
               <a:t>四级</a:t>
             </a:r>
+            <a:endParaRPr lang="zh-CN" altLang="en-US"/>
           </a:p>
           <a:p>
             <a:pPr lvl="4"/>
@@ -1489,7 +1721,6 @@
           <a:p>
             <a:fld id="{CE875574-B30F-E946-8A30-5D40B09C42BE}" type="datetimeFigureOut">
               <a:rPr lang="en-US" smtClean="0"/>
-              <a:t>6/3/22</a:t>
             </a:fld>
             <a:endParaRPr lang="en-US"/>
           </a:p>
@@ -1531,7 +1762,6 @@
           <a:p>
             <a:fld id="{671D2AD8-20DD-1F43-B782-FEE6429B9542}" type="slidenum">
               <a:rPr lang="en-US" smtClean="0"/>
-              <a:t>‹#›</a:t>
             </a:fld>
             <a:endParaRPr lang="en-US"/>
           </a:p>
@@ -1615,6 +1845,7 @@
               <a:rPr lang="zh-CN" altLang="en-US"/>
               <a:t>单击此处编辑母版文本样式</a:t>
             </a:r>
+            <a:endParaRPr lang="zh-CN" altLang="en-US"/>
           </a:p>
           <a:p>
             <a:pPr lvl="1"/>
@@ -1622,6 +1853,7 @@
               <a:rPr lang="zh-CN" altLang="en-US"/>
               <a:t>二级</a:t>
             </a:r>
+            <a:endParaRPr lang="zh-CN" altLang="en-US"/>
           </a:p>
           <a:p>
             <a:pPr lvl="2"/>
@@ -1629,6 +1861,7 @@
               <a:rPr lang="zh-CN" altLang="en-US"/>
               <a:t>三级</a:t>
             </a:r>
+            <a:endParaRPr lang="zh-CN" altLang="en-US"/>
           </a:p>
           <a:p>
             <a:pPr lvl="3"/>
@@ -1636,6 +1869,7 @@
               <a:rPr lang="zh-CN" altLang="en-US"/>
               <a:t>四级</a:t>
             </a:r>
+            <a:endParaRPr lang="zh-CN" altLang="en-US"/>
           </a:p>
           <a:p>
             <a:pPr lvl="4"/>
@@ -1664,7 +1898,6 @@
           <a:p>
             <a:fld id="{CE875574-B30F-E946-8A30-5D40B09C42BE}" type="datetimeFigureOut">
               <a:rPr lang="en-US" smtClean="0"/>
-              <a:t>6/3/22</a:t>
             </a:fld>
             <a:endParaRPr lang="en-US"/>
           </a:p>
@@ -1706,7 +1939,6 @@
           <a:p>
             <a:fld id="{671D2AD8-20DD-1F43-B782-FEE6429B9542}" type="slidenum">
               <a:rPr lang="en-US" smtClean="0"/>
-              <a:t>‹#›</a:t>
             </a:fld>
             <a:endParaRPr lang="en-US"/>
           </a:p>
@@ -1855,6 +2087,7 @@
               <a:rPr lang="zh-CN" altLang="en-US"/>
               <a:t>单击此处编辑母版文本样式</a:t>
             </a:r>
+            <a:endParaRPr lang="zh-CN" altLang="en-US"/>
           </a:p>
           <a:p>
             <a:pPr lvl="1"/>
@@ -1862,6 +2095,7 @@
               <a:rPr lang="zh-CN" altLang="en-US"/>
               <a:t>二级</a:t>
             </a:r>
+            <a:endParaRPr lang="zh-CN" altLang="en-US"/>
           </a:p>
           <a:p>
             <a:pPr lvl="2"/>
@@ -1869,6 +2103,7 @@
               <a:rPr lang="zh-CN" altLang="en-US"/>
               <a:t>三级</a:t>
             </a:r>
+            <a:endParaRPr lang="zh-CN" altLang="en-US"/>
           </a:p>
           <a:p>
             <a:pPr lvl="3"/>
@@ -1876,6 +2111,7 @@
               <a:rPr lang="zh-CN" altLang="en-US"/>
               <a:t>四级</a:t>
             </a:r>
+            <a:endParaRPr lang="zh-CN" altLang="en-US"/>
           </a:p>
           <a:p>
             <a:pPr lvl="4"/>
@@ -1904,7 +2140,6 @@
           <a:p>
             <a:fld id="{CE875574-B30F-E946-8A30-5D40B09C42BE}" type="datetimeFigureOut">
               <a:rPr lang="en-US" smtClean="0"/>
-              <a:t>6/3/22</a:t>
             </a:fld>
             <a:endParaRPr lang="en-US"/>
           </a:p>
@@ -1946,7 +2181,6 @@
           <a:p>
             <a:fld id="{671D2AD8-20DD-1F43-B782-FEE6429B9542}" type="slidenum">
               <a:rPr lang="en-US" smtClean="0"/>
-              <a:t>‹#›</a:t>
             </a:fld>
             <a:endParaRPr lang="en-US"/>
           </a:p>
@@ -2125,6 +2359,7 @@
               <a:rPr lang="zh-CN" altLang="en-US"/>
               <a:t>单击此处编辑母版文本样式</a:t>
             </a:r>
+            <a:endParaRPr lang="zh-CN" altLang="en-US"/>
           </a:p>
         </p:txBody>
       </p:sp>
@@ -2145,7 +2380,6 @@
           <a:p>
             <a:fld id="{CE875574-B30F-E946-8A30-5D40B09C42BE}" type="datetimeFigureOut">
               <a:rPr lang="en-US" smtClean="0"/>
-              <a:t>6/3/22</a:t>
             </a:fld>
             <a:endParaRPr lang="en-US"/>
           </a:p>
@@ -2187,7 +2421,6 @@
           <a:p>
             <a:fld id="{671D2AD8-20DD-1F43-B782-FEE6429B9542}" type="slidenum">
               <a:rPr lang="en-US" smtClean="0"/>
-              <a:t>‹#›</a:t>
             </a:fld>
             <a:endParaRPr lang="en-US"/>
           </a:p>
@@ -2266,6 +2499,7 @@
               <a:rPr lang="zh-CN" altLang="en-US"/>
               <a:t>单击此处编辑母版文本样式</a:t>
             </a:r>
+            <a:endParaRPr lang="zh-CN" altLang="en-US"/>
           </a:p>
           <a:p>
             <a:pPr lvl="1"/>
@@ -2273,6 +2507,7 @@
               <a:rPr lang="zh-CN" altLang="en-US"/>
               <a:t>二级</a:t>
             </a:r>
+            <a:endParaRPr lang="zh-CN" altLang="en-US"/>
           </a:p>
           <a:p>
             <a:pPr lvl="2"/>
@@ -2280,6 +2515,7 @@
               <a:rPr lang="zh-CN" altLang="en-US"/>
               <a:t>三级</a:t>
             </a:r>
+            <a:endParaRPr lang="zh-CN" altLang="en-US"/>
           </a:p>
           <a:p>
             <a:pPr lvl="3"/>
@@ -2287,6 +2523,7 @@
               <a:rPr lang="zh-CN" altLang="en-US"/>
               <a:t>四级</a:t>
             </a:r>
+            <a:endParaRPr lang="zh-CN" altLang="en-US"/>
           </a:p>
           <a:p>
             <a:pPr lvl="4"/>
@@ -2323,6 +2560,7 @@
               <a:rPr lang="zh-CN" altLang="en-US"/>
               <a:t>单击此处编辑母版文本样式</a:t>
             </a:r>
+            <a:endParaRPr lang="zh-CN" altLang="en-US"/>
           </a:p>
           <a:p>
             <a:pPr lvl="1"/>
@@ -2330,6 +2568,7 @@
               <a:rPr lang="zh-CN" altLang="en-US"/>
               <a:t>二级</a:t>
             </a:r>
+            <a:endParaRPr lang="zh-CN" altLang="en-US"/>
           </a:p>
           <a:p>
             <a:pPr lvl="2"/>
@@ -2337,6 +2576,7 @@
               <a:rPr lang="zh-CN" altLang="en-US"/>
               <a:t>三级</a:t>
             </a:r>
+            <a:endParaRPr lang="zh-CN" altLang="en-US"/>
           </a:p>
           <a:p>
             <a:pPr lvl="3"/>
@@ -2344,6 +2584,7 @@
               <a:rPr lang="zh-CN" altLang="en-US"/>
               <a:t>四级</a:t>
             </a:r>
+            <a:endParaRPr lang="zh-CN" altLang="en-US"/>
           </a:p>
           <a:p>
             <a:pPr lvl="4"/>
@@ -2372,7 +2613,6 @@
           <a:p>
             <a:fld id="{CE875574-B30F-E946-8A30-5D40B09C42BE}" type="datetimeFigureOut">
               <a:rPr lang="en-US" smtClean="0"/>
-              <a:t>6/3/22</a:t>
             </a:fld>
             <a:endParaRPr lang="en-US"/>
           </a:p>
@@ -2414,7 +2654,6 @@
           <a:p>
             <a:fld id="{671D2AD8-20DD-1F43-B782-FEE6429B9542}" type="slidenum">
               <a:rPr lang="en-US" smtClean="0"/>
-              <a:t>‹#›</a:t>
             </a:fld>
             <a:endParaRPr lang="en-US"/>
           </a:p>
@@ -2535,6 +2774,7 @@
               <a:rPr lang="zh-CN" altLang="en-US"/>
               <a:t>单击此处编辑母版文本样式</a:t>
             </a:r>
+            <a:endParaRPr lang="zh-CN" altLang="en-US"/>
           </a:p>
         </p:txBody>
       </p:sp>
@@ -2563,6 +2803,7 @@
               <a:rPr lang="zh-CN" altLang="en-US"/>
               <a:t>单击此处编辑母版文本样式</a:t>
             </a:r>
+            <a:endParaRPr lang="zh-CN" altLang="en-US"/>
           </a:p>
           <a:p>
             <a:pPr lvl="1"/>
@@ -2570,6 +2811,7 @@
               <a:rPr lang="zh-CN" altLang="en-US"/>
               <a:t>二级</a:t>
             </a:r>
+            <a:endParaRPr lang="zh-CN" altLang="en-US"/>
           </a:p>
           <a:p>
             <a:pPr lvl="2"/>
@@ -2577,6 +2819,7 @@
               <a:rPr lang="zh-CN" altLang="en-US"/>
               <a:t>三级</a:t>
             </a:r>
+            <a:endParaRPr lang="zh-CN" altLang="en-US"/>
           </a:p>
           <a:p>
             <a:pPr lvl="3"/>
@@ -2584,6 +2827,7 @@
               <a:rPr lang="zh-CN" altLang="en-US"/>
               <a:t>四级</a:t>
             </a:r>
+            <a:endParaRPr lang="zh-CN" altLang="en-US"/>
           </a:p>
           <a:p>
             <a:pPr lvl="4"/>
@@ -2657,6 +2901,7 @@
               <a:rPr lang="zh-CN" altLang="en-US"/>
               <a:t>单击此处编辑母版文本样式</a:t>
             </a:r>
+            <a:endParaRPr lang="zh-CN" altLang="en-US"/>
           </a:p>
         </p:txBody>
       </p:sp>
@@ -2685,6 +2930,7 @@
               <a:rPr lang="zh-CN" altLang="en-US"/>
               <a:t>单击此处编辑母版文本样式</a:t>
             </a:r>
+            <a:endParaRPr lang="zh-CN" altLang="en-US"/>
           </a:p>
           <a:p>
             <a:pPr lvl="1"/>
@@ -2692,6 +2938,7 @@
               <a:rPr lang="zh-CN" altLang="en-US"/>
               <a:t>二级</a:t>
             </a:r>
+            <a:endParaRPr lang="zh-CN" altLang="en-US"/>
           </a:p>
           <a:p>
             <a:pPr lvl="2"/>
@@ -2699,6 +2946,7 @@
               <a:rPr lang="zh-CN" altLang="en-US"/>
               <a:t>三级</a:t>
             </a:r>
+            <a:endParaRPr lang="zh-CN" altLang="en-US"/>
           </a:p>
           <a:p>
             <a:pPr lvl="3"/>
@@ -2706,6 +2954,7 @@
               <a:rPr lang="zh-CN" altLang="en-US"/>
               <a:t>四级</a:t>
             </a:r>
+            <a:endParaRPr lang="zh-CN" altLang="en-US"/>
           </a:p>
           <a:p>
             <a:pPr lvl="4"/>
@@ -2734,7 +2983,6 @@
           <a:p>
             <a:fld id="{CE875574-B30F-E946-8A30-5D40B09C42BE}" type="datetimeFigureOut">
               <a:rPr lang="en-US" smtClean="0"/>
-              <a:t>6/3/22</a:t>
             </a:fld>
             <a:endParaRPr lang="en-US"/>
           </a:p>
@@ -2776,7 +3024,6 @@
           <a:p>
             <a:fld id="{671D2AD8-20DD-1F43-B782-FEE6429B9542}" type="slidenum">
               <a:rPr lang="en-US" smtClean="0"/>
-              <a:t>‹#›</a:t>
             </a:fld>
             <a:endParaRPr lang="en-US"/>
           </a:p>
@@ -2847,7 +3094,6 @@
           <a:p>
             <a:fld id="{CE875574-B30F-E946-8A30-5D40B09C42BE}" type="datetimeFigureOut">
               <a:rPr lang="en-US" smtClean="0"/>
-              <a:t>6/3/22</a:t>
             </a:fld>
             <a:endParaRPr lang="en-US"/>
           </a:p>
@@ -2889,7 +3135,6 @@
           <a:p>
             <a:fld id="{671D2AD8-20DD-1F43-B782-FEE6429B9542}" type="slidenum">
               <a:rPr lang="en-US" smtClean="0"/>
-              <a:t>‹#›</a:t>
             </a:fld>
             <a:endParaRPr lang="en-US"/>
           </a:p>
@@ -2937,7 +3182,6 @@
           <a:p>
             <a:fld id="{CE875574-B30F-E946-8A30-5D40B09C42BE}" type="datetimeFigureOut">
               <a:rPr lang="en-US" smtClean="0"/>
-              <a:t>6/3/22</a:t>
             </a:fld>
             <a:endParaRPr lang="en-US"/>
           </a:p>
@@ -2979,7 +3223,6 @@
           <a:p>
             <a:fld id="{671D2AD8-20DD-1F43-B782-FEE6429B9542}" type="slidenum">
               <a:rPr lang="en-US" smtClean="0"/>
-              <a:t>‹#›</a:t>
             </a:fld>
             <a:endParaRPr lang="en-US"/>
           </a:p>
@@ -3095,6 +3338,7 @@
               <a:rPr lang="zh-CN" altLang="en-US"/>
               <a:t>单击此处编辑母版文本样式</a:t>
             </a:r>
+            <a:endParaRPr lang="zh-CN" altLang="en-US"/>
           </a:p>
           <a:p>
             <a:pPr lvl="1"/>
@@ -3102,6 +3346,7 @@
               <a:rPr lang="zh-CN" altLang="en-US"/>
               <a:t>二级</a:t>
             </a:r>
+            <a:endParaRPr lang="zh-CN" altLang="en-US"/>
           </a:p>
           <a:p>
             <a:pPr lvl="2"/>
@@ -3109,6 +3354,7 @@
               <a:rPr lang="zh-CN" altLang="en-US"/>
               <a:t>三级</a:t>
             </a:r>
+            <a:endParaRPr lang="zh-CN" altLang="en-US"/>
           </a:p>
           <a:p>
             <a:pPr lvl="3"/>
@@ -3116,6 +3362,7 @@
               <a:rPr lang="zh-CN" altLang="en-US"/>
               <a:t>四级</a:t>
             </a:r>
+            <a:endParaRPr lang="zh-CN" altLang="en-US"/>
           </a:p>
           <a:p>
             <a:pPr lvl="4"/>
@@ -3189,6 +3436,7 @@
               <a:rPr lang="zh-CN" altLang="en-US"/>
               <a:t>单击此处编辑母版文本样式</a:t>
             </a:r>
+            <a:endParaRPr lang="zh-CN" altLang="en-US"/>
           </a:p>
         </p:txBody>
       </p:sp>
@@ -3209,7 +3457,6 @@
           <a:p>
             <a:fld id="{CE875574-B30F-E946-8A30-5D40B09C42BE}" type="datetimeFigureOut">
               <a:rPr lang="en-US" smtClean="0"/>
-              <a:t>6/3/22</a:t>
             </a:fld>
             <a:endParaRPr lang="en-US"/>
           </a:p>
@@ -3251,7 +3498,6 @@
           <a:p>
             <a:fld id="{671D2AD8-20DD-1F43-B782-FEE6429B9542}" type="slidenum">
               <a:rPr lang="en-US" smtClean="0"/>
-              <a:t>‹#›</a:t>
             </a:fld>
             <a:endParaRPr lang="en-US"/>
           </a:p>
@@ -3441,6 +3687,7 @@
               <a:rPr lang="zh-CN" altLang="en-US"/>
               <a:t>单击此处编辑母版文本样式</a:t>
             </a:r>
+            <a:endParaRPr lang="zh-CN" altLang="en-US"/>
           </a:p>
         </p:txBody>
       </p:sp>
@@ -3461,7 +3708,6 @@
           <a:p>
             <a:fld id="{CE875574-B30F-E946-8A30-5D40B09C42BE}" type="datetimeFigureOut">
               <a:rPr lang="en-US" smtClean="0"/>
-              <a:t>6/3/22</a:t>
             </a:fld>
             <a:endParaRPr lang="en-US"/>
           </a:p>
@@ -3503,7 +3749,6 @@
           <a:p>
             <a:fld id="{671D2AD8-20DD-1F43-B782-FEE6429B9542}" type="slidenum">
               <a:rPr lang="en-US" smtClean="0"/>
-              <a:t>‹#›</a:t>
             </a:fld>
             <a:endParaRPr lang="en-US"/>
           </a:p>
@@ -3602,6 +3847,7 @@
               <a:rPr lang="zh-CN" altLang="en-US"/>
               <a:t>单击此处编辑母版文本样式</a:t>
             </a:r>
+            <a:endParaRPr lang="zh-CN" altLang="en-US"/>
           </a:p>
           <a:p>
             <a:pPr lvl="1"/>
@@ -3609,6 +3855,7 @@
               <a:rPr lang="zh-CN" altLang="en-US"/>
               <a:t>二级</a:t>
             </a:r>
+            <a:endParaRPr lang="zh-CN" altLang="en-US"/>
           </a:p>
           <a:p>
             <a:pPr lvl="2"/>
@@ -3616,6 +3863,7 @@
               <a:rPr lang="zh-CN" altLang="en-US"/>
               <a:t>三级</a:t>
             </a:r>
+            <a:endParaRPr lang="zh-CN" altLang="en-US"/>
           </a:p>
           <a:p>
             <a:pPr lvl="3"/>
@@ -3623,6 +3871,7 @@
               <a:rPr lang="zh-CN" altLang="en-US"/>
               <a:t>四级</a:t>
             </a:r>
+            <a:endParaRPr lang="zh-CN" altLang="en-US"/>
           </a:p>
           <a:p>
             <a:pPr lvl="4"/>
@@ -3669,7 +3918,6 @@
           <a:p>
             <a:fld id="{CE875574-B30F-E946-8A30-5D40B09C42BE}" type="datetimeFigureOut">
               <a:rPr lang="en-US" smtClean="0"/>
-              <a:t>6/3/22</a:t>
             </a:fld>
             <a:endParaRPr lang="en-US"/>
           </a:p>
@@ -3747,7 +3995,6 @@
           <a:p>
             <a:fld id="{671D2AD8-20DD-1F43-B782-FEE6429B9542}" type="slidenum">
               <a:rPr lang="en-US" smtClean="0"/>
-              <a:t>‹#›</a:t>
             </a:fld>
             <a:endParaRPr lang="en-US"/>
           </a:p>
@@ -4079,7 +4326,7 @@
           <p:nvPr/>
         </p:nvPicPr>
         <p:blipFill>
-          <a:blip r:embed="rId3">
+          <a:blip r:embed="rId1">
             <a:clrChange>
               <a:clrFrom>
                 <a:srgbClr val="FFFFFF"/>
@@ -4531,11 +4778,991 @@
             </a:r>
             <a:r>
               <a:rPr lang="en-US" altLang="zh-CN" dirty="0"/>
-              <a:t>2022.5.28</a:t>
-            </a:r>
-          </a:p>
-        </p:txBody>
-      </p:sp>
+              <a:t>2022.6.4</a:t>
+            </a:r>
+            <a:endParaRPr lang="en-US" altLang="zh-CN" dirty="0"/>
+          </a:p>
+        </p:txBody>
+      </p:sp>
+    </p:spTree>
+  </p:cSld>
+  <p:clrMapOvr>
+    <a:masterClrMapping/>
+  </p:clrMapOvr>
+</p:sld>
+</file>
+
+<file path=ppt/slides/slide10.xml><?xml version="1.0" encoding="utf-8"?>
+<p:sld xmlns:a="http://schemas.openxmlformats.org/drawingml/2006/main" xmlns:r="http://schemas.openxmlformats.org/officeDocument/2006/relationships" xmlns:p="http://schemas.openxmlformats.org/presentationml/2006/main">
+  <p:cSld>
+    <p:spTree>
+      <p:nvGrpSpPr>
+        <p:cNvPr id="1" name=""/>
+        <p:cNvGrpSpPr/>
+        <p:nvPr/>
+      </p:nvGrpSpPr>
+      <p:grpSpPr>
+        <a:xfrm>
+          <a:off x="0" y="0"/>
+          <a:ext cx="0" cy="0"/>
+          <a:chOff x="0" y="0"/>
+          <a:chExt cx="0" cy="0"/>
+        </a:xfrm>
+      </p:grpSpPr>
+      <p:sp>
+        <p:nvSpPr>
+          <p:cNvPr id="11" name="标题 1"/>
+          <p:cNvSpPr txBox="1"/>
+          <p:nvPr/>
+        </p:nvSpPr>
+        <p:spPr>
+          <a:xfrm>
+            <a:off x="1170269" y="797307"/>
+            <a:ext cx="10030487" cy="961382"/>
+          </a:xfrm>
+          <a:prstGeom prst="rect">
+            <a:avLst/>
+          </a:prstGeom>
+        </p:spPr>
+        <p:txBody>
+          <a:bodyPr/>
+          <a:lstStyle>
+            <a:lvl1pPr algn="l" defTabSz="914400" rtl="0" eaLnBrk="1" latinLnBrk="0" hangingPunct="1">
+              <a:lnSpc>
+                <a:spcPct val="90000"/>
+              </a:lnSpc>
+              <a:spcBef>
+                <a:spcPct val="0"/>
+              </a:spcBef>
+              <a:buNone/>
+              <a:defRPr sz="4400" kern="1200">
+                <a:solidFill>
+                  <a:schemeClr val="tx1"/>
+                </a:solidFill>
+                <a:latin typeface="+mj-lt"/>
+                <a:ea typeface="+mj-ea"/>
+                <a:cs typeface="+mj-cs"/>
+              </a:defRPr>
+            </a:lvl1pPr>
+          </a:lstStyle>
+          <a:p>
+            <a:r>
+              <a:rPr lang="en-US" altLang="zh-CN" sz="4000" b="1" dirty="0" err="1">
+                <a:solidFill>
+                  <a:srgbClr val="704F95"/>
+                </a:solidFill>
+                <a:latin typeface="思源宋体 Medium" panose="02020500000000000000" pitchFamily="18" charset="-122"/>
+                <a:ea typeface="思源宋体 Medium" panose="02020500000000000000" pitchFamily="18" charset="-122"/>
+              </a:rPr>
+              <a:t>Qemu</a:t>
+            </a:r>
+            <a:r>
+              <a:rPr lang="zh-CN" altLang="en-US" sz="4000" b="1" dirty="0">
+                <a:solidFill>
+                  <a:srgbClr val="704F95"/>
+                </a:solidFill>
+                <a:latin typeface="思源宋体 Medium" panose="02020500000000000000" pitchFamily="18" charset="-122"/>
+                <a:ea typeface="思源宋体 Medium" panose="02020500000000000000" pitchFamily="18" charset="-122"/>
+              </a:rPr>
+              <a:t>未来</a:t>
+            </a:r>
+            <a:endParaRPr lang="en-US" altLang="zh-CN" sz="4000" b="1" dirty="0">
+              <a:solidFill>
+                <a:srgbClr val="704F95"/>
+              </a:solidFill>
+              <a:latin typeface="思源宋体 Medium" panose="02020500000000000000" pitchFamily="18" charset="-122"/>
+              <a:ea typeface="思源宋体 Medium" panose="02020500000000000000" pitchFamily="18" charset="-122"/>
+            </a:endParaRPr>
+          </a:p>
+        </p:txBody>
+      </p:sp>
+      <p:sp>
+        <p:nvSpPr>
+          <p:cNvPr id="43" name="Rectangle 236"/>
+          <p:cNvSpPr/>
+          <p:nvPr/>
+        </p:nvSpPr>
+        <p:spPr>
+          <a:xfrm>
+            <a:off x="987616" y="797307"/>
+            <a:ext cx="10395795" cy="923330"/>
+          </a:xfrm>
+          <a:prstGeom prst="rect">
+            <a:avLst/>
+          </a:prstGeom>
+          <a:noFill/>
+        </p:spPr>
+        <p:txBody>
+          <a:bodyPr wrap="none" lIns="91440" tIns="45720" rIns="91440" bIns="45720">
+            <a:spAutoFit/>
+            <a:scene3d>
+              <a:camera prst="orthographicFront"/>
+              <a:lightRig rig="soft" dir="t">
+                <a:rot lat="0" lon="0" rev="15600000"/>
+              </a:lightRig>
+            </a:scene3d>
+            <a:sp3d extrusionH="57150" prstMaterial="softEdge">
+              <a:bevelT w="25400" h="38100"/>
+            </a:sp3d>
+          </a:bodyPr>
+          <a:lstStyle/>
+          <a:p>
+            <a:pPr algn="ctr"/>
+            <a:r>
+              <a:rPr lang="zh-CN" altLang="en-US" sz="5400" b="1" u="sng" dirty="0">
+                <a:solidFill>
+                  <a:srgbClr val="803A87"/>
+                </a:solidFill>
+              </a:rPr>
+              <a:t>                                                               </a:t>
+            </a:r>
+            <a:endParaRPr lang="en-US" altLang="zh-CN" sz="5400" b="1" u="sng" dirty="0">
+              <a:solidFill>
+                <a:srgbClr val="803A87"/>
+              </a:solidFill>
+            </a:endParaRPr>
+          </a:p>
+        </p:txBody>
+      </p:sp>
+      <p:pic>
+        <p:nvPicPr>
+          <p:cNvPr id="44" name="Picture 8"/>
+          <p:cNvPicPr/>
+          <p:nvPr/>
+        </p:nvPicPr>
+        <p:blipFill>
+          <a:blip r:embed="rId1">
+            <a:clrChange>
+              <a:clrFrom>
+                <a:srgbClr val="FFFFFF"/>
+              </a:clrFrom>
+              <a:clrTo>
+                <a:srgbClr val="FFFFFF">
+                  <a:alpha val="0"/>
+                </a:srgbClr>
+              </a:clrTo>
+            </a:clrChange>
+          </a:blip>
+          <a:stretch>
+            <a:fillRect/>
+          </a:stretch>
+        </p:blipFill>
+        <p:spPr>
+          <a:xfrm>
+            <a:off x="7880269" y="6297384"/>
+            <a:ext cx="4120587" cy="514122"/>
+          </a:xfrm>
+          <a:prstGeom prst="rect">
+            <a:avLst/>
+          </a:prstGeom>
+        </p:spPr>
+      </p:pic>
+      <p:sp>
+        <p:nvSpPr>
+          <p:cNvPr id="8" name="文本占位符 1"/>
+          <p:cNvSpPr txBox="1"/>
+          <p:nvPr/>
+        </p:nvSpPr>
+        <p:spPr>
+          <a:xfrm>
+            <a:off x="6371771" y="263796"/>
+            <a:ext cx="5629085" cy="328059"/>
+          </a:xfrm>
+          <a:prstGeom prst="rect">
+            <a:avLst/>
+          </a:prstGeom>
+          <a:ln w="12700" cmpd="sng">
+            <a:noFill/>
+          </a:ln>
+        </p:spPr>
+        <p:txBody>
+          <a:bodyPr vert="horz" anchor="ctr"/>
+          <a:lstStyle>
+            <a:lvl1pPr marL="0" indent="0" algn="l" defTabSz="914400" rtl="0" eaLnBrk="1" latinLnBrk="0" hangingPunct="1">
+              <a:lnSpc>
+                <a:spcPct val="90000"/>
+              </a:lnSpc>
+              <a:spcBef>
+                <a:spcPts val="1000"/>
+              </a:spcBef>
+              <a:buFont typeface="Arial" panose="020B0604020202020204" pitchFamily="34" charset="0"/>
+              <a:buNone/>
+              <a:defRPr sz="1400" b="1" kern="1200">
+                <a:solidFill>
+                  <a:schemeClr val="tx1"/>
+                </a:solidFill>
+                <a:latin typeface="微软雅黑" charset="0"/>
+                <a:ea typeface="微软雅黑" charset="0"/>
+                <a:cs typeface="微软雅黑" charset="0"/>
+              </a:defRPr>
+            </a:lvl1pPr>
+            <a:lvl2pPr marL="685800" indent="-228600" algn="l" defTabSz="914400" rtl="0" eaLnBrk="1" latinLnBrk="0" hangingPunct="1">
+              <a:lnSpc>
+                <a:spcPct val="90000"/>
+              </a:lnSpc>
+              <a:spcBef>
+                <a:spcPts val="500"/>
+              </a:spcBef>
+              <a:buFont typeface="Arial" panose="020B0604020202020204" pitchFamily="34" charset="0"/>
+              <a:buChar char="•"/>
+              <a:defRPr sz="2400" kern="1200">
+                <a:solidFill>
+                  <a:schemeClr val="tx1"/>
+                </a:solidFill>
+                <a:latin typeface="+mn-lt"/>
+                <a:ea typeface="+mn-ea"/>
+                <a:cs typeface="+mn-cs"/>
+              </a:defRPr>
+            </a:lvl2pPr>
+            <a:lvl3pPr marL="1143000" indent="-228600" algn="l" defTabSz="914400" rtl="0" eaLnBrk="1" latinLnBrk="0" hangingPunct="1">
+              <a:lnSpc>
+                <a:spcPct val="90000"/>
+              </a:lnSpc>
+              <a:spcBef>
+                <a:spcPts val="500"/>
+              </a:spcBef>
+              <a:buFont typeface="Arial" panose="020B0604020202020204" pitchFamily="34" charset="0"/>
+              <a:buChar char="•"/>
+              <a:defRPr sz="2000" kern="1200">
+                <a:solidFill>
+                  <a:schemeClr val="tx1"/>
+                </a:solidFill>
+                <a:latin typeface="+mn-lt"/>
+                <a:ea typeface="+mn-ea"/>
+                <a:cs typeface="+mn-cs"/>
+              </a:defRPr>
+            </a:lvl3pPr>
+            <a:lvl4pPr marL="1600200" indent="-228600" algn="l" defTabSz="914400" rtl="0" eaLnBrk="1" latinLnBrk="0" hangingPunct="1">
+              <a:lnSpc>
+                <a:spcPct val="90000"/>
+              </a:lnSpc>
+              <a:spcBef>
+                <a:spcPts val="500"/>
+              </a:spcBef>
+              <a:buFont typeface="Arial" panose="020B0604020202020204" pitchFamily="34" charset="0"/>
+              <a:buChar char="•"/>
+              <a:defRPr sz="1800" kern="1200">
+                <a:solidFill>
+                  <a:schemeClr val="tx1"/>
+                </a:solidFill>
+                <a:latin typeface="+mn-lt"/>
+                <a:ea typeface="+mn-ea"/>
+                <a:cs typeface="+mn-cs"/>
+              </a:defRPr>
+            </a:lvl4pPr>
+            <a:lvl5pPr marL="2057400" indent="-228600" algn="l" defTabSz="914400" rtl="0" eaLnBrk="1" latinLnBrk="0" hangingPunct="1">
+              <a:lnSpc>
+                <a:spcPct val="90000"/>
+              </a:lnSpc>
+              <a:spcBef>
+                <a:spcPts val="500"/>
+              </a:spcBef>
+              <a:buFont typeface="Arial" panose="020B0604020202020204" pitchFamily="34" charset="0"/>
+              <a:buChar char="•"/>
+              <a:defRPr sz="1800" kern="1200">
+                <a:solidFill>
+                  <a:schemeClr val="tx1"/>
+                </a:solidFill>
+                <a:latin typeface="+mn-lt"/>
+                <a:ea typeface="+mn-ea"/>
+                <a:cs typeface="+mn-cs"/>
+              </a:defRPr>
+            </a:lvl5pPr>
+            <a:lvl6pPr marL="2514600" indent="-228600" algn="l" defTabSz="914400" rtl="0" eaLnBrk="1" latinLnBrk="0" hangingPunct="1">
+              <a:lnSpc>
+                <a:spcPct val="90000"/>
+              </a:lnSpc>
+              <a:spcBef>
+                <a:spcPts val="500"/>
+              </a:spcBef>
+              <a:buFont typeface="Arial" panose="020B0604020202020204" pitchFamily="34" charset="0"/>
+              <a:buChar char="•"/>
+              <a:defRPr sz="1800" kern="1200">
+                <a:solidFill>
+                  <a:schemeClr val="tx1"/>
+                </a:solidFill>
+                <a:latin typeface="+mn-lt"/>
+                <a:ea typeface="+mn-ea"/>
+                <a:cs typeface="+mn-cs"/>
+              </a:defRPr>
+            </a:lvl6pPr>
+            <a:lvl7pPr marL="2971800" indent="-228600" algn="l" defTabSz="914400" rtl="0" eaLnBrk="1" latinLnBrk="0" hangingPunct="1">
+              <a:lnSpc>
+                <a:spcPct val="90000"/>
+              </a:lnSpc>
+              <a:spcBef>
+                <a:spcPts val="500"/>
+              </a:spcBef>
+              <a:buFont typeface="Arial" panose="020B0604020202020204" pitchFamily="34" charset="0"/>
+              <a:buChar char="•"/>
+              <a:defRPr sz="1800" kern="1200">
+                <a:solidFill>
+                  <a:schemeClr val="tx1"/>
+                </a:solidFill>
+                <a:latin typeface="+mn-lt"/>
+                <a:ea typeface="+mn-ea"/>
+                <a:cs typeface="+mn-cs"/>
+              </a:defRPr>
+            </a:lvl7pPr>
+            <a:lvl8pPr marL="3429000" indent="-228600" algn="l" defTabSz="914400" rtl="0" eaLnBrk="1" latinLnBrk="0" hangingPunct="1">
+              <a:lnSpc>
+                <a:spcPct val="90000"/>
+              </a:lnSpc>
+              <a:spcBef>
+                <a:spcPts val="500"/>
+              </a:spcBef>
+              <a:buFont typeface="Arial" panose="020B0604020202020204" pitchFamily="34" charset="0"/>
+              <a:buChar char="•"/>
+              <a:defRPr sz="1800" kern="1200">
+                <a:solidFill>
+                  <a:schemeClr val="tx1"/>
+                </a:solidFill>
+                <a:latin typeface="+mn-lt"/>
+                <a:ea typeface="+mn-ea"/>
+                <a:cs typeface="+mn-cs"/>
+              </a:defRPr>
+            </a:lvl8pPr>
+            <a:lvl9pPr marL="3886200" indent="-228600" algn="l" defTabSz="914400" rtl="0" eaLnBrk="1" latinLnBrk="0" hangingPunct="1">
+              <a:lnSpc>
+                <a:spcPct val="90000"/>
+              </a:lnSpc>
+              <a:spcBef>
+                <a:spcPts val="500"/>
+              </a:spcBef>
+              <a:buFont typeface="Arial" panose="020B0604020202020204" pitchFamily="34" charset="0"/>
+              <a:buChar char="•"/>
+              <a:defRPr sz="1800" kern="1200">
+                <a:solidFill>
+                  <a:schemeClr val="tx1"/>
+                </a:solidFill>
+                <a:latin typeface="+mn-lt"/>
+                <a:ea typeface="+mn-ea"/>
+                <a:cs typeface="+mn-cs"/>
+              </a:defRPr>
+            </a:lvl9pPr>
+          </a:lstStyle>
+          <a:p>
+            <a:pPr algn="r"/>
+            <a:endParaRPr lang="en-US" altLang="zh-CN" dirty="0">
+              <a:solidFill>
+                <a:srgbClr val="704F95"/>
+              </a:solidFill>
+              <a:latin typeface="思源宋体 Medium" panose="02020500000000000000" pitchFamily="18" charset="-122"/>
+              <a:ea typeface="思源宋体 Medium" panose="02020500000000000000" pitchFamily="18" charset="-122"/>
+            </a:endParaRPr>
+          </a:p>
+        </p:txBody>
+      </p:sp>
+      <p:sp>
+        <p:nvSpPr>
+          <p:cNvPr id="6" name="Content Placeholder 2"/>
+          <p:cNvSpPr txBox="1"/>
+          <p:nvPr/>
+        </p:nvSpPr>
+        <p:spPr>
+          <a:xfrm>
+            <a:off x="1113971" y="1801282"/>
+            <a:ext cx="10515600" cy="4351338"/>
+          </a:xfrm>
+          <a:prstGeom prst="rect">
+            <a:avLst/>
+          </a:prstGeom>
+        </p:spPr>
+        <p:txBody>
+          <a:bodyPr>
+            <a:normAutofit/>
+          </a:bodyPr>
+          <a:lstStyle>
+            <a:lvl1pPr marL="228600" indent="-228600" algn="l" defTabSz="914400" rtl="0" eaLnBrk="1" latinLnBrk="0" hangingPunct="1">
+              <a:lnSpc>
+                <a:spcPct val="90000"/>
+              </a:lnSpc>
+              <a:spcBef>
+                <a:spcPts val="1000"/>
+              </a:spcBef>
+              <a:buFont typeface="Arial" panose="020B0604020202020204" pitchFamily="34" charset="0"/>
+              <a:buChar char="•"/>
+              <a:defRPr sz="2800" kern="1200">
+                <a:solidFill>
+                  <a:schemeClr val="tx1"/>
+                </a:solidFill>
+                <a:latin typeface="+mn-lt"/>
+                <a:ea typeface="+mn-ea"/>
+                <a:cs typeface="+mn-cs"/>
+              </a:defRPr>
+            </a:lvl1pPr>
+            <a:lvl2pPr marL="685800" indent="-228600" algn="l" defTabSz="914400" rtl="0" eaLnBrk="1" latinLnBrk="0" hangingPunct="1">
+              <a:lnSpc>
+                <a:spcPct val="90000"/>
+              </a:lnSpc>
+              <a:spcBef>
+                <a:spcPts val="500"/>
+              </a:spcBef>
+              <a:buFont typeface="Arial" panose="020B0604020202020204" pitchFamily="34" charset="0"/>
+              <a:buChar char="•"/>
+              <a:defRPr sz="2400" kern="1200">
+                <a:solidFill>
+                  <a:schemeClr val="tx1"/>
+                </a:solidFill>
+                <a:latin typeface="+mn-lt"/>
+                <a:ea typeface="+mn-ea"/>
+                <a:cs typeface="+mn-cs"/>
+              </a:defRPr>
+            </a:lvl2pPr>
+            <a:lvl3pPr marL="1143000" indent="-228600" algn="l" defTabSz="914400" rtl="0" eaLnBrk="1" latinLnBrk="0" hangingPunct="1">
+              <a:lnSpc>
+                <a:spcPct val="90000"/>
+              </a:lnSpc>
+              <a:spcBef>
+                <a:spcPts val="500"/>
+              </a:spcBef>
+              <a:buFont typeface="Arial" panose="020B0604020202020204" pitchFamily="34" charset="0"/>
+              <a:buChar char="•"/>
+              <a:defRPr sz="2000" kern="1200">
+                <a:solidFill>
+                  <a:schemeClr val="tx1"/>
+                </a:solidFill>
+                <a:latin typeface="+mn-lt"/>
+                <a:ea typeface="+mn-ea"/>
+                <a:cs typeface="+mn-cs"/>
+              </a:defRPr>
+            </a:lvl3pPr>
+            <a:lvl4pPr marL="1600200" indent="-228600" algn="l" defTabSz="914400" rtl="0" eaLnBrk="1" latinLnBrk="0" hangingPunct="1">
+              <a:lnSpc>
+                <a:spcPct val="90000"/>
+              </a:lnSpc>
+              <a:spcBef>
+                <a:spcPts val="500"/>
+              </a:spcBef>
+              <a:buFont typeface="Arial" panose="020B0604020202020204" pitchFamily="34" charset="0"/>
+              <a:buChar char="•"/>
+              <a:defRPr sz="1800" kern="1200">
+                <a:solidFill>
+                  <a:schemeClr val="tx1"/>
+                </a:solidFill>
+                <a:latin typeface="+mn-lt"/>
+                <a:ea typeface="+mn-ea"/>
+                <a:cs typeface="+mn-cs"/>
+              </a:defRPr>
+            </a:lvl4pPr>
+            <a:lvl5pPr marL="2057400" indent="-228600" algn="l" defTabSz="914400" rtl="0" eaLnBrk="1" latinLnBrk="0" hangingPunct="1">
+              <a:lnSpc>
+                <a:spcPct val="90000"/>
+              </a:lnSpc>
+              <a:spcBef>
+                <a:spcPts val="500"/>
+              </a:spcBef>
+              <a:buFont typeface="Arial" panose="020B0604020202020204" pitchFamily="34" charset="0"/>
+              <a:buChar char="•"/>
+              <a:defRPr sz="1800" kern="1200">
+                <a:solidFill>
+                  <a:schemeClr val="tx1"/>
+                </a:solidFill>
+                <a:latin typeface="+mn-lt"/>
+                <a:ea typeface="+mn-ea"/>
+                <a:cs typeface="+mn-cs"/>
+              </a:defRPr>
+            </a:lvl5pPr>
+            <a:lvl6pPr marL="2514600" indent="-228600" algn="l" defTabSz="914400" rtl="0" eaLnBrk="1" latinLnBrk="0" hangingPunct="1">
+              <a:lnSpc>
+                <a:spcPct val="90000"/>
+              </a:lnSpc>
+              <a:spcBef>
+                <a:spcPts val="500"/>
+              </a:spcBef>
+              <a:buFont typeface="Arial" panose="020B0604020202020204" pitchFamily="34" charset="0"/>
+              <a:buChar char="•"/>
+              <a:defRPr sz="1800" kern="1200">
+                <a:solidFill>
+                  <a:schemeClr val="tx1"/>
+                </a:solidFill>
+                <a:latin typeface="+mn-lt"/>
+                <a:ea typeface="+mn-ea"/>
+                <a:cs typeface="+mn-cs"/>
+              </a:defRPr>
+            </a:lvl6pPr>
+            <a:lvl7pPr marL="2971800" indent="-228600" algn="l" defTabSz="914400" rtl="0" eaLnBrk="1" latinLnBrk="0" hangingPunct="1">
+              <a:lnSpc>
+                <a:spcPct val="90000"/>
+              </a:lnSpc>
+              <a:spcBef>
+                <a:spcPts val="500"/>
+              </a:spcBef>
+              <a:buFont typeface="Arial" panose="020B0604020202020204" pitchFamily="34" charset="0"/>
+              <a:buChar char="•"/>
+              <a:defRPr sz="1800" kern="1200">
+                <a:solidFill>
+                  <a:schemeClr val="tx1"/>
+                </a:solidFill>
+                <a:latin typeface="+mn-lt"/>
+                <a:ea typeface="+mn-ea"/>
+                <a:cs typeface="+mn-cs"/>
+              </a:defRPr>
+            </a:lvl7pPr>
+            <a:lvl8pPr marL="3429000" indent="-228600" algn="l" defTabSz="914400" rtl="0" eaLnBrk="1" latinLnBrk="0" hangingPunct="1">
+              <a:lnSpc>
+                <a:spcPct val="90000"/>
+              </a:lnSpc>
+              <a:spcBef>
+                <a:spcPts val="500"/>
+              </a:spcBef>
+              <a:buFont typeface="Arial" panose="020B0604020202020204" pitchFamily="34" charset="0"/>
+              <a:buChar char="•"/>
+              <a:defRPr sz="1800" kern="1200">
+                <a:solidFill>
+                  <a:schemeClr val="tx1"/>
+                </a:solidFill>
+                <a:latin typeface="+mn-lt"/>
+                <a:ea typeface="+mn-ea"/>
+                <a:cs typeface="+mn-cs"/>
+              </a:defRPr>
+            </a:lvl8pPr>
+            <a:lvl9pPr marL="3886200" indent="-228600" algn="l" defTabSz="914400" rtl="0" eaLnBrk="1" latinLnBrk="0" hangingPunct="1">
+              <a:lnSpc>
+                <a:spcPct val="90000"/>
+              </a:lnSpc>
+              <a:spcBef>
+                <a:spcPts val="500"/>
+              </a:spcBef>
+              <a:buFont typeface="Arial" panose="020B0604020202020204" pitchFamily="34" charset="0"/>
+              <a:buChar char="•"/>
+              <a:defRPr sz="1800" kern="1200">
+                <a:solidFill>
+                  <a:schemeClr val="tx1"/>
+                </a:solidFill>
+                <a:latin typeface="+mn-lt"/>
+                <a:ea typeface="+mn-ea"/>
+                <a:cs typeface="+mn-cs"/>
+              </a:defRPr>
+            </a:lvl9pPr>
+          </a:lstStyle>
+          <a:p>
+            <a:r>
+              <a:rPr lang="zh-CN" altLang="en-US" dirty="0">
+                <a:latin typeface="+mn-ea"/>
+              </a:rPr>
+              <a:t>整理汇报内容</a:t>
+            </a:r>
+            <a:endParaRPr lang="en-US" altLang="zh-CN" dirty="0">
+              <a:latin typeface="+mn-ea"/>
+            </a:endParaRPr>
+          </a:p>
+          <a:p>
+            <a:r>
+              <a:rPr lang="zh-CN" altLang="en-US" dirty="0">
+                <a:latin typeface="+mn-ea"/>
+              </a:rPr>
+              <a:t>为</a:t>
+            </a:r>
+            <a:r>
+              <a:rPr lang="en-US" altLang="zh-CN" dirty="0">
+                <a:latin typeface="+mn-ea"/>
+              </a:rPr>
+              <a:t>OS</a:t>
+            </a:r>
+            <a:r>
+              <a:rPr lang="zh-CN" altLang="en-US" dirty="0">
+                <a:latin typeface="+mn-ea"/>
+              </a:rPr>
+              <a:t>做</a:t>
+            </a:r>
+            <a:r>
+              <a:rPr lang="zh-CN" altLang="en-US">
+                <a:latin typeface="+mn-ea"/>
+              </a:rPr>
+              <a:t>规划和准备</a:t>
+            </a:r>
+            <a:endParaRPr lang="zh-CN" altLang="en-US" dirty="0">
+              <a:latin typeface="+mn-ea"/>
+            </a:endParaRPr>
+          </a:p>
+        </p:txBody>
+      </p:sp>
+    </p:spTree>
+  </p:cSld>
+  <p:clrMapOvr>
+    <a:masterClrMapping/>
+  </p:clrMapOvr>
+</p:sld>
+</file>
+
+<file path=ppt/slides/slide11.xml><?xml version="1.0" encoding="utf-8"?>
+<p:sld xmlns:a="http://schemas.openxmlformats.org/drawingml/2006/main" xmlns:r="http://schemas.openxmlformats.org/officeDocument/2006/relationships" xmlns:p="http://schemas.openxmlformats.org/presentationml/2006/main">
+  <p:cSld>
+    <p:spTree>
+      <p:nvGrpSpPr>
+        <p:cNvPr id="1" name=""/>
+        <p:cNvGrpSpPr/>
+        <p:nvPr/>
+      </p:nvGrpSpPr>
+      <p:grpSpPr>
+        <a:xfrm>
+          <a:off x="0" y="0"/>
+          <a:ext cx="0" cy="0"/>
+          <a:chOff x="0" y="0"/>
+          <a:chExt cx="0" cy="0"/>
+        </a:xfrm>
+      </p:grpSpPr>
+      <p:sp>
+        <p:nvSpPr>
+          <p:cNvPr id="10" name="内容占位符 2"/>
+          <p:cNvSpPr txBox="1"/>
+          <p:nvPr/>
+        </p:nvSpPr>
+        <p:spPr>
+          <a:xfrm>
+            <a:off x="1787831" y="2024290"/>
+            <a:ext cx="8456364" cy="4152673"/>
+          </a:xfrm>
+          <a:prstGeom prst="rect">
+            <a:avLst/>
+          </a:prstGeom>
+        </p:spPr>
+        <p:txBody>
+          <a:bodyPr/>
+          <a:lstStyle>
+            <a:lvl1pPr marL="228600" indent="-228600" algn="l" defTabSz="914400" rtl="0" eaLnBrk="1" latinLnBrk="0" hangingPunct="1">
+              <a:lnSpc>
+                <a:spcPct val="90000"/>
+              </a:lnSpc>
+              <a:spcBef>
+                <a:spcPts val="1000"/>
+              </a:spcBef>
+              <a:buFont typeface="Arial" panose="020B0604020202020204" pitchFamily="34" charset="0"/>
+              <a:buChar char="•"/>
+              <a:defRPr sz="2800" kern="1200">
+                <a:solidFill>
+                  <a:schemeClr val="tx1"/>
+                </a:solidFill>
+                <a:latin typeface="+mn-lt"/>
+                <a:ea typeface="+mn-ea"/>
+                <a:cs typeface="+mn-cs"/>
+              </a:defRPr>
+            </a:lvl1pPr>
+            <a:lvl2pPr marL="685800" indent="-228600" algn="l" defTabSz="914400" rtl="0" eaLnBrk="1" latinLnBrk="0" hangingPunct="1">
+              <a:lnSpc>
+                <a:spcPct val="90000"/>
+              </a:lnSpc>
+              <a:spcBef>
+                <a:spcPts val="500"/>
+              </a:spcBef>
+              <a:buFont typeface="Arial" panose="020B0604020202020204" pitchFamily="34" charset="0"/>
+              <a:buChar char="•"/>
+              <a:defRPr sz="2400" kern="1200">
+                <a:solidFill>
+                  <a:schemeClr val="tx1"/>
+                </a:solidFill>
+                <a:latin typeface="+mn-lt"/>
+                <a:ea typeface="+mn-ea"/>
+                <a:cs typeface="+mn-cs"/>
+              </a:defRPr>
+            </a:lvl2pPr>
+            <a:lvl3pPr marL="1143000" indent="-228600" algn="l" defTabSz="914400" rtl="0" eaLnBrk="1" latinLnBrk="0" hangingPunct="1">
+              <a:lnSpc>
+                <a:spcPct val="90000"/>
+              </a:lnSpc>
+              <a:spcBef>
+                <a:spcPts val="500"/>
+              </a:spcBef>
+              <a:buFont typeface="Arial" panose="020B0604020202020204" pitchFamily="34" charset="0"/>
+              <a:buChar char="•"/>
+              <a:defRPr sz="2000" kern="1200">
+                <a:solidFill>
+                  <a:schemeClr val="tx1"/>
+                </a:solidFill>
+                <a:latin typeface="+mn-lt"/>
+                <a:ea typeface="+mn-ea"/>
+                <a:cs typeface="+mn-cs"/>
+              </a:defRPr>
+            </a:lvl3pPr>
+            <a:lvl4pPr marL="1600200" indent="-228600" algn="l" defTabSz="914400" rtl="0" eaLnBrk="1" latinLnBrk="0" hangingPunct="1">
+              <a:lnSpc>
+                <a:spcPct val="90000"/>
+              </a:lnSpc>
+              <a:spcBef>
+                <a:spcPts val="500"/>
+              </a:spcBef>
+              <a:buFont typeface="Arial" panose="020B0604020202020204" pitchFamily="34" charset="0"/>
+              <a:buChar char="•"/>
+              <a:defRPr sz="1800" kern="1200">
+                <a:solidFill>
+                  <a:schemeClr val="tx1"/>
+                </a:solidFill>
+                <a:latin typeface="+mn-lt"/>
+                <a:ea typeface="+mn-ea"/>
+                <a:cs typeface="+mn-cs"/>
+              </a:defRPr>
+            </a:lvl4pPr>
+            <a:lvl5pPr marL="2057400" indent="-228600" algn="l" defTabSz="914400" rtl="0" eaLnBrk="1" latinLnBrk="0" hangingPunct="1">
+              <a:lnSpc>
+                <a:spcPct val="90000"/>
+              </a:lnSpc>
+              <a:spcBef>
+                <a:spcPts val="500"/>
+              </a:spcBef>
+              <a:buFont typeface="Arial" panose="020B0604020202020204" pitchFamily="34" charset="0"/>
+              <a:buChar char="•"/>
+              <a:defRPr sz="1800" kern="1200">
+                <a:solidFill>
+                  <a:schemeClr val="tx1"/>
+                </a:solidFill>
+                <a:latin typeface="+mn-lt"/>
+                <a:ea typeface="+mn-ea"/>
+                <a:cs typeface="+mn-cs"/>
+              </a:defRPr>
+            </a:lvl5pPr>
+            <a:lvl6pPr marL="2514600" indent="-228600" algn="l" defTabSz="914400" rtl="0" eaLnBrk="1" latinLnBrk="0" hangingPunct="1">
+              <a:lnSpc>
+                <a:spcPct val="90000"/>
+              </a:lnSpc>
+              <a:spcBef>
+                <a:spcPts val="500"/>
+              </a:spcBef>
+              <a:buFont typeface="Arial" panose="020B0604020202020204" pitchFamily="34" charset="0"/>
+              <a:buChar char="•"/>
+              <a:defRPr sz="1800" kern="1200">
+                <a:solidFill>
+                  <a:schemeClr val="tx1"/>
+                </a:solidFill>
+                <a:latin typeface="+mn-lt"/>
+                <a:ea typeface="+mn-ea"/>
+                <a:cs typeface="+mn-cs"/>
+              </a:defRPr>
+            </a:lvl6pPr>
+            <a:lvl7pPr marL="2971800" indent="-228600" algn="l" defTabSz="914400" rtl="0" eaLnBrk="1" latinLnBrk="0" hangingPunct="1">
+              <a:lnSpc>
+                <a:spcPct val="90000"/>
+              </a:lnSpc>
+              <a:spcBef>
+                <a:spcPts val="500"/>
+              </a:spcBef>
+              <a:buFont typeface="Arial" panose="020B0604020202020204" pitchFamily="34" charset="0"/>
+              <a:buChar char="•"/>
+              <a:defRPr sz="1800" kern="1200">
+                <a:solidFill>
+                  <a:schemeClr val="tx1"/>
+                </a:solidFill>
+                <a:latin typeface="+mn-lt"/>
+                <a:ea typeface="+mn-ea"/>
+                <a:cs typeface="+mn-cs"/>
+              </a:defRPr>
+            </a:lvl7pPr>
+            <a:lvl8pPr marL="3429000" indent="-228600" algn="l" defTabSz="914400" rtl="0" eaLnBrk="1" latinLnBrk="0" hangingPunct="1">
+              <a:lnSpc>
+                <a:spcPct val="90000"/>
+              </a:lnSpc>
+              <a:spcBef>
+                <a:spcPts val="500"/>
+              </a:spcBef>
+              <a:buFont typeface="Arial" panose="020B0604020202020204" pitchFamily="34" charset="0"/>
+              <a:buChar char="•"/>
+              <a:defRPr sz="1800" kern="1200">
+                <a:solidFill>
+                  <a:schemeClr val="tx1"/>
+                </a:solidFill>
+                <a:latin typeface="+mn-lt"/>
+                <a:ea typeface="+mn-ea"/>
+                <a:cs typeface="+mn-cs"/>
+              </a:defRPr>
+            </a:lvl8pPr>
+            <a:lvl9pPr marL="3886200" indent="-228600" algn="l" defTabSz="914400" rtl="0" eaLnBrk="1" latinLnBrk="0" hangingPunct="1">
+              <a:lnSpc>
+                <a:spcPct val="90000"/>
+              </a:lnSpc>
+              <a:spcBef>
+                <a:spcPts val="500"/>
+              </a:spcBef>
+              <a:buFont typeface="Arial" panose="020B0604020202020204" pitchFamily="34" charset="0"/>
+              <a:buChar char="•"/>
+              <a:defRPr sz="1800" kern="1200">
+                <a:solidFill>
+                  <a:schemeClr val="tx1"/>
+                </a:solidFill>
+                <a:latin typeface="+mn-lt"/>
+                <a:ea typeface="+mn-ea"/>
+                <a:cs typeface="+mn-cs"/>
+              </a:defRPr>
+            </a:lvl9pPr>
+          </a:lstStyle>
+          <a:p>
+            <a:pPr marL="0" indent="0">
+              <a:buNone/>
+            </a:pPr>
+            <a:endParaRPr kumimoji="1" lang="zh-CN" altLang="en-US" dirty="0">
+              <a:solidFill>
+                <a:srgbClr val="FF0000"/>
+              </a:solidFill>
+            </a:endParaRPr>
+          </a:p>
+          <a:p>
+            <a:pPr marL="0" indent="0">
+              <a:buNone/>
+            </a:pPr>
+            <a:endParaRPr kumimoji="1" lang="zh-CN" altLang="en-US" dirty="0">
+              <a:solidFill>
+                <a:srgbClr val="FF0000"/>
+              </a:solidFill>
+            </a:endParaRPr>
+          </a:p>
+          <a:p>
+            <a:pPr marL="0" indent="0" algn="ctr">
+              <a:buNone/>
+            </a:pPr>
+            <a:r>
+              <a:rPr kumimoji="1" lang="zh-CN" altLang="en-US" sz="4400" dirty="0">
+                <a:solidFill>
+                  <a:srgbClr val="704F95"/>
+                </a:solidFill>
+                <a:latin typeface="思源宋体 Heavy" panose="02020900000000000000" pitchFamily="18" charset="-122"/>
+                <a:ea typeface="思源宋体 Heavy" panose="02020900000000000000" pitchFamily="18" charset="-122"/>
+              </a:rPr>
+              <a:t>交流时间</a:t>
+            </a:r>
+            <a:endParaRPr kumimoji="1" lang="en-US" altLang="zh-CN" sz="4400" dirty="0">
+              <a:solidFill>
+                <a:srgbClr val="704F95"/>
+              </a:solidFill>
+              <a:latin typeface="思源宋体 Heavy" panose="02020900000000000000" pitchFamily="18" charset="-122"/>
+              <a:ea typeface="思源宋体 Heavy" panose="02020900000000000000" pitchFamily="18" charset="-122"/>
+            </a:endParaRPr>
+          </a:p>
+        </p:txBody>
+      </p:sp>
+      <p:pic>
+        <p:nvPicPr>
+          <p:cNvPr id="8" name="Picture 8"/>
+          <p:cNvPicPr/>
+          <p:nvPr/>
+        </p:nvPicPr>
+        <p:blipFill>
+          <a:blip r:embed="rId1">
+            <a:clrChange>
+              <a:clrFrom>
+                <a:srgbClr val="FFFFFF"/>
+              </a:clrFrom>
+              <a:clrTo>
+                <a:srgbClr val="FFFFFF">
+                  <a:alpha val="0"/>
+                </a:srgbClr>
+              </a:clrTo>
+            </a:clrChange>
+          </a:blip>
+          <a:stretch>
+            <a:fillRect/>
+          </a:stretch>
+        </p:blipFill>
+        <p:spPr>
+          <a:xfrm>
+            <a:off x="7880269" y="6297384"/>
+            <a:ext cx="4120587" cy="514122"/>
+          </a:xfrm>
+          <a:prstGeom prst="rect">
+            <a:avLst/>
+          </a:prstGeom>
+        </p:spPr>
+      </p:pic>
+      <p:sp>
+        <p:nvSpPr>
+          <p:cNvPr id="5" name="Rectangle 236"/>
+          <p:cNvSpPr/>
+          <p:nvPr/>
+        </p:nvSpPr>
+        <p:spPr>
+          <a:xfrm>
+            <a:off x="880107" y="752160"/>
+            <a:ext cx="10395795" cy="923330"/>
+          </a:xfrm>
+          <a:prstGeom prst="rect">
+            <a:avLst/>
+          </a:prstGeom>
+          <a:noFill/>
+        </p:spPr>
+        <p:txBody>
+          <a:bodyPr wrap="none" lIns="91440" tIns="45720" rIns="91440" bIns="45720">
+            <a:spAutoFit/>
+            <a:scene3d>
+              <a:camera prst="orthographicFront"/>
+              <a:lightRig rig="soft" dir="t">
+                <a:rot lat="0" lon="0" rev="15600000"/>
+              </a:lightRig>
+            </a:scene3d>
+            <a:sp3d extrusionH="57150" prstMaterial="softEdge">
+              <a:bevelT w="25400" h="38100"/>
+            </a:sp3d>
+          </a:bodyPr>
+          <a:lstStyle/>
+          <a:p>
+            <a:pPr algn="ctr"/>
+            <a:r>
+              <a:rPr lang="zh-CN" altLang="en-US" sz="5400" b="1" u="sng">
+                <a:solidFill>
+                  <a:srgbClr val="803A87"/>
+                </a:solidFill>
+              </a:rPr>
+              <a:t>                                                               </a:t>
+            </a:r>
+            <a:endParaRPr lang="en-US" altLang="zh-CN" sz="5400" b="1" u="sng" dirty="0">
+              <a:solidFill>
+                <a:srgbClr val="803A87"/>
+              </a:solidFill>
+            </a:endParaRPr>
+          </a:p>
+        </p:txBody>
+      </p:sp>
+      <p:pic>
+        <p:nvPicPr>
+          <p:cNvPr id="11" name="图片 3"/>
+          <p:cNvPicPr>
+            <a:picLocks noChangeAspect="1"/>
+          </p:cNvPicPr>
+          <p:nvPr/>
+        </p:nvPicPr>
+        <p:blipFill>
+          <a:blip r:embed="rId2" cstate="print">
+            <a:extLst>
+              <a:ext uri="{28A0092B-C50C-407E-A947-70E740481C1C}">
+                <a14:useLocalDpi xmlns:a14="http://schemas.microsoft.com/office/drawing/2010/main" val="0"/>
+              </a:ext>
+            </a:extLst>
+          </a:blip>
+          <a:srcRect/>
+          <a:stretch>
+            <a:fillRect/>
+          </a:stretch>
+        </p:blipFill>
+        <p:spPr bwMode="auto">
+          <a:xfrm>
+            <a:off x="1330234" y="308691"/>
+            <a:ext cx="1073156" cy="1086219"/>
+          </a:xfrm>
+          <a:prstGeom prst="rect">
+            <a:avLst/>
+          </a:prstGeom>
+          <a:noFill/>
+          <a:ln>
+            <a:noFill/>
+          </a:ln>
+          <a:extLst>
+            <a:ext uri="{909E8E84-426E-40DD-AFC4-6F175D3DCCD1}">
+              <a14:hiddenFill xmlns:a14="http://schemas.microsoft.com/office/drawing/2010/main">
+                <a:solidFill>
+                  <a:srgbClr val="FFFFFF"/>
+                </a:solidFill>
+              </a14:hiddenFill>
+            </a:ext>
+            <a:ext uri="{91240B29-F687-4F45-9708-019B960494DF}">
+              <a14:hiddenLine xmlns:a14="http://schemas.microsoft.com/office/drawing/2010/main" w="9525">
+                <a:solidFill>
+                  <a:srgbClr val="000000"/>
+                </a:solidFill>
+                <a:miter lim="800000"/>
+                <a:headEnd/>
+                <a:tailEnd/>
+              </a14:hiddenLine>
+            </a:ext>
+          </a:extLst>
+        </p:spPr>
+      </p:pic>
     </p:spTree>
   </p:cSld>
   <p:clrMapOvr>
@@ -4608,6 +5835,13 @@
               </a:rPr>
               <a:t>目录</a:t>
             </a:r>
+            <a:endParaRPr lang="zh-CN" altLang="en-US" sz="4000" b="1" dirty="0">
+              <a:solidFill>
+                <a:srgbClr val="704F95"/>
+              </a:solidFill>
+              <a:latin typeface="思源宋体 Medium" panose="02020500000000000000" pitchFamily="18" charset="-122"/>
+              <a:ea typeface="思源宋体 Medium" panose="02020500000000000000" pitchFamily="18" charset="-122"/>
+            </a:endParaRPr>
           </a:p>
         </p:txBody>
       </p:sp>
@@ -4666,7 +5900,7 @@
           <p:nvPr/>
         </p:nvPicPr>
         <p:blipFill>
-          <a:blip r:embed="rId3">
+          <a:blip r:embed="rId1">
             <a:clrChange>
               <a:clrFrom>
                 <a:srgbClr val="FFFFFF"/>
@@ -4889,6 +6123,7 @@
               <a:rPr lang="zh-CN" altLang="en-US" sz="3200" dirty="0"/>
               <a:t>未来的规划</a:t>
             </a:r>
+            <a:endParaRPr lang="zh-CN" altLang="en-US" sz="3200" dirty="0"/>
           </a:p>
         </p:txBody>
       </p:sp>
@@ -5039,7 +6274,7 @@
           <p:nvPr/>
         </p:nvPicPr>
         <p:blipFill>
-          <a:blip r:embed="rId3">
+          <a:blip r:embed="rId1">
             <a:clrChange>
               <a:clrFrom>
                 <a:srgbClr val="FFFFFF"/>
@@ -5474,6 +6709,26 @@
               </a:rPr>
               <a:t>-tutorial</a:t>
             </a:r>
+            <a:endParaRPr lang="en-US" altLang="zh-CN" dirty="0">
+              <a:latin typeface="+mn-ea"/>
+            </a:endParaRPr>
+          </a:p>
+          <a:p>
+            <a:r>
+              <a:rPr lang="zh-CN" altLang="en-US" dirty="0">
+                <a:latin typeface="+mn-ea"/>
+              </a:rPr>
+              <a:t>跑通</a:t>
+            </a:r>
+            <a:r>
+              <a:rPr lang="en-US" altLang="zh-CN" dirty="0">
+                <a:latin typeface="+mn-ea"/>
+              </a:rPr>
+              <a:t>intel ipc-bench</a:t>
+            </a:r>
+            <a:endParaRPr lang="en-US" altLang="zh-CN" dirty="0">
+              <a:latin typeface="+mn-ea"/>
+            </a:endParaRPr>
           </a:p>
           <a:p>
             <a:r>
@@ -5500,6 +6755,9 @@
               </a:rPr>
               <a:t>log</a:t>
             </a:r>
+            <a:endParaRPr lang="en-US" altLang="zh-CN" dirty="0">
+              <a:latin typeface="+mn-ea"/>
+            </a:endParaRPr>
           </a:p>
         </p:txBody>
       </p:sp>
@@ -5670,7 +6928,7 @@
           <p:nvPr/>
         </p:nvPicPr>
         <p:blipFill>
-          <a:blip r:embed="rId3">
+          <a:blip r:embed="rId1">
             <a:clrChange>
               <a:clrFrom>
                 <a:srgbClr val="FFFFFF"/>
@@ -6084,20 +7342,14 @@
       </p:sp>
       <p:pic>
         <p:nvPicPr>
-          <p:cNvPr id="2" name="Picture 1">
-            <a:extLst>
-              <a:ext uri="{FF2B5EF4-FFF2-40B4-BE49-F238E27FC236}">
-                <a16:creationId xmlns:a16="http://schemas.microsoft.com/office/drawing/2014/main" id="{3197C911-570D-5541-BB49-7A44D91093B7}"/>
-              </a:ext>
-            </a:extLst>
-          </p:cNvPr>
+          <p:cNvPr id="2" name="Picture 1"/>
           <p:cNvPicPr>
             <a:picLocks noChangeAspect="1"/>
           </p:cNvPicPr>
           <p:nvPr/>
         </p:nvPicPr>
         <p:blipFill>
-          <a:blip r:embed="rId4"/>
+          <a:blip r:embed="rId2"/>
           <a:stretch>
             <a:fillRect/>
           </a:stretch>
@@ -6289,7 +7541,7 @@
           <p:nvPr/>
         </p:nvPicPr>
         <p:blipFill>
-          <a:blip r:embed="rId3">
+          <a:blip r:embed="rId1">
             <a:clrChange>
               <a:clrFrom>
                 <a:srgbClr val="FFFFFF"/>
@@ -6703,20 +7955,14 @@
       </p:sp>
       <p:pic>
         <p:nvPicPr>
-          <p:cNvPr id="3" name="Picture 2">
-            <a:extLst>
-              <a:ext uri="{FF2B5EF4-FFF2-40B4-BE49-F238E27FC236}">
-                <a16:creationId xmlns:a16="http://schemas.microsoft.com/office/drawing/2014/main" id="{663982E5-6E39-114B-9012-03856ECCFEE0}"/>
-              </a:ext>
-            </a:extLst>
-          </p:cNvPr>
+          <p:cNvPr id="3" name="Picture 2"/>
           <p:cNvPicPr>
             <a:picLocks noChangeAspect="1"/>
           </p:cNvPicPr>
           <p:nvPr/>
         </p:nvPicPr>
         <p:blipFill>
-          <a:blip r:embed="rId4"/>
+          <a:blip r:embed="rId2"/>
           <a:stretch>
             <a:fillRect/>
           </a:stretch>
@@ -6849,7 +8095,7 @@
                 <a:latin typeface="思源宋体 Medium" panose="02020500000000000000" pitchFamily="18" charset="-122"/>
                 <a:ea typeface="思源宋体 Medium" panose="02020500000000000000" pitchFamily="18" charset="-122"/>
               </a:rPr>
-              <a:t>运行</a:t>
+              <a:t>跑通</a:t>
             </a:r>
             <a:r>
               <a:rPr lang="en-US" altLang="zh-CN" sz="4000" b="1" dirty="0" err="1">
@@ -6881,6 +8127,13 @@
               </a:rPr>
               <a:t> uintr ipc benchmark</a:t>
             </a:r>
+            <a:endParaRPr lang="en-US" altLang="zh-CN" sz="4000" b="1" dirty="0" err="1">
+              <a:solidFill>
+                <a:srgbClr val="704F95"/>
+              </a:solidFill>
+              <a:latin typeface="思源宋体 Medium" panose="02020500000000000000" pitchFamily="18" charset="-122"/>
+              <a:ea typeface="思源宋体 Medium" panose="02020500000000000000" pitchFamily="18" charset="-122"/>
+            </a:endParaRPr>
           </a:p>
         </p:txBody>
       </p:sp>
@@ -6891,7 +8144,7 @@
           <p:nvPr/>
         </p:nvPicPr>
         <p:blipFill>
-          <a:blip r:embed="rId3">
+          <a:blip r:embed="rId1">
             <a:clrChange>
               <a:clrFrom>
                 <a:srgbClr val="FFFFFF"/>
@@ -7298,38 +8551,71 @@
           </a:lstStyle>
           <a:p>
             <a:r>
-              <a:rPr lang="zh-CN" dirty="0">
+              <a:rPr lang="zh-CN" altLang="en-US" dirty="0">
                 <a:latin typeface="+mn-ea"/>
               </a:rPr>
-              <a:t>代码地址：https://github.com/OS-F-4/ipc-bench/tree/linux-rfc-v1</a:t>
-            </a:r>
-          </a:p>
-          <a:p>
-            <a:endParaRPr lang="zh-CN" dirty="0">
-              <a:latin typeface="+mn-ea"/>
-            </a:endParaRPr>
-          </a:p>
-          <a:p>
-            <a:r>
-              <a:rPr lang="zh-CN" dirty="0">
+              <a:t>修复上周遗留的</a:t>
+            </a:r>
+            <a:r>
+              <a:rPr lang="en-US" altLang="zh-CN" dirty="0">
                 <a:latin typeface="+mn-ea"/>
               </a:rPr>
-              <a:t>主要工作：</a:t>
-            </a:r>
-          </a:p>
-          <a:p>
-            <a:r>
-              <a:rPr lang="zh-CN" dirty="0">
-                <a:latin typeface="+mn-ea"/>
+              <a:t> bug</a:t>
+            </a:r>
+            <a:r>
+              <a:rPr lang="zh-CN" altLang="en-US" strike="sngStrike" dirty="0">
+                <a:solidFill>
+                  <a:schemeClr val="tx1"/>
+                </a:solidFill>
+                <a:uFillTx/>
+                <a:latin typeface="+中文正文" charset="0"/>
               </a:rPr>
-              <a:t>需要使用一个更接近实际的文件系统</a:t>
-            </a:r>
-            <a:endParaRPr lang="en-US" altLang="zh-CN" dirty="0">
-              <a:latin typeface="+mn-ea"/>
+              <a:t>（</a:t>
+            </a:r>
+            <a:r>
+              <a:rPr lang="zh-CN" strike="sngStrike" dirty="0">
+                <a:solidFill>
+                  <a:schemeClr val="tx1"/>
+                </a:solidFill>
+                <a:uFillTx/>
+                <a:latin typeface="+中文正文" charset="0"/>
+              </a:rPr>
+              <a:t>灵活运用工具，调试体验极佳）</a:t>
+            </a:r>
+            <a:endParaRPr lang="zh-CN" strike="sngStrike" dirty="0">
+              <a:solidFill>
+                <a:schemeClr val="tx1"/>
+              </a:solidFill>
+              <a:uFillTx/>
+              <a:latin typeface="+中文正文" charset="0"/>
             </a:endParaRPr>
           </a:p>
         </p:txBody>
       </p:sp>
+      <p:pic>
+        <p:nvPicPr>
+          <p:cNvPr id="2" name="图片 1" descr="Screenshot_20220603_232139"/>
+          <p:cNvPicPr>
+            <a:picLocks noChangeAspect="1"/>
+          </p:cNvPicPr>
+          <p:nvPr/>
+        </p:nvPicPr>
+        <p:blipFill>
+          <a:blip r:embed="rId2"/>
+          <a:stretch>
+            <a:fillRect/>
+          </a:stretch>
+        </p:blipFill>
+        <p:spPr>
+          <a:xfrm>
+            <a:off x="1753235" y="2264410"/>
+            <a:ext cx="7849235" cy="4456430"/>
+          </a:xfrm>
+          <a:prstGeom prst="rect">
+            <a:avLst/>
+          </a:prstGeom>
+        </p:spPr>
+      </p:pic>
     </p:spTree>
   </p:cSld>
   <p:clrMapOvr>
@@ -7357,73 +8643,6 @@
       </p:grpSpPr>
       <p:sp>
         <p:nvSpPr>
-          <p:cNvPr id="11" name="标题 1"/>
-          <p:cNvSpPr txBox="1"/>
-          <p:nvPr/>
-        </p:nvSpPr>
-        <p:spPr>
-          <a:xfrm>
-            <a:off x="1170269" y="797307"/>
-            <a:ext cx="10030487" cy="961382"/>
-          </a:xfrm>
-          <a:prstGeom prst="rect">
-            <a:avLst/>
-          </a:prstGeom>
-        </p:spPr>
-        <p:txBody>
-          <a:bodyPr/>
-          <a:lstStyle>
-            <a:lvl1pPr algn="l" defTabSz="914400" rtl="0" eaLnBrk="1" latinLnBrk="0" hangingPunct="1">
-              <a:lnSpc>
-                <a:spcPct val="90000"/>
-              </a:lnSpc>
-              <a:spcBef>
-                <a:spcPct val="0"/>
-              </a:spcBef>
-              <a:buNone/>
-              <a:defRPr sz="4400" kern="1200">
-                <a:solidFill>
-                  <a:schemeClr val="tx1"/>
-                </a:solidFill>
-                <a:latin typeface="+mj-lt"/>
-                <a:ea typeface="+mj-ea"/>
-                <a:cs typeface="+mj-cs"/>
-              </a:defRPr>
-            </a:lvl1pPr>
-          </a:lstStyle>
-          <a:p>
-            <a:r>
-              <a:rPr lang="en-US" altLang="zh-CN" sz="4000" b="1" dirty="0" err="1">
-                <a:solidFill>
-                  <a:srgbClr val="704F95"/>
-                </a:solidFill>
-                <a:latin typeface="思源宋体 Medium" panose="02020500000000000000" pitchFamily="18" charset="-122"/>
-                <a:ea typeface="思源宋体 Medium" panose="02020500000000000000" pitchFamily="18" charset="-122"/>
-              </a:rPr>
-              <a:t>Qemu</a:t>
-            </a:r>
-            <a:r>
-              <a:rPr lang="zh-CN" altLang="en-US" sz="4000" b="1" dirty="0">
-                <a:solidFill>
-                  <a:srgbClr val="704F95"/>
-                </a:solidFill>
-                <a:latin typeface="思源宋体 Medium" panose="02020500000000000000" pitchFamily="18" charset="-122"/>
-                <a:ea typeface="思源宋体 Medium" panose="02020500000000000000" pitchFamily="18" charset="-122"/>
-              </a:rPr>
-              <a:t>未来</a:t>
-            </a:r>
-            <a:endParaRPr lang="en-US" altLang="zh-CN" sz="4000" b="1" dirty="0">
-              <a:solidFill>
-                <a:srgbClr val="704F95"/>
-              </a:solidFill>
-              <a:latin typeface="思源宋体 Medium" panose="02020500000000000000" pitchFamily="18" charset="-122"/>
-              <a:ea typeface="思源宋体 Medium" panose="02020500000000000000" pitchFamily="18" charset="-122"/>
-            </a:endParaRPr>
-          </a:p>
-        </p:txBody>
-      </p:sp>
-      <p:sp>
-        <p:nvSpPr>
           <p:cNvPr id="43" name="Rectangle 236"/>
           <p:cNvSpPr/>
           <p:nvPr/>
@@ -7470,6 +8689,93 @@
           </a:p>
         </p:txBody>
       </p:sp>
+      <p:sp>
+        <p:nvSpPr>
+          <p:cNvPr id="11" name="标题 1"/>
+          <p:cNvSpPr txBox="1"/>
+          <p:nvPr/>
+        </p:nvSpPr>
+        <p:spPr>
+          <a:xfrm>
+            <a:off x="1170269" y="797307"/>
+            <a:ext cx="10030487" cy="961382"/>
+          </a:xfrm>
+          <a:prstGeom prst="rect">
+            <a:avLst/>
+          </a:prstGeom>
+        </p:spPr>
+        <p:txBody>
+          <a:bodyPr/>
+          <a:lstStyle>
+            <a:lvl1pPr algn="l" defTabSz="914400" rtl="0" eaLnBrk="1" latinLnBrk="0" hangingPunct="1">
+              <a:lnSpc>
+                <a:spcPct val="90000"/>
+              </a:lnSpc>
+              <a:spcBef>
+                <a:spcPct val="0"/>
+              </a:spcBef>
+              <a:buNone/>
+              <a:defRPr sz="4400" kern="1200">
+                <a:solidFill>
+                  <a:schemeClr val="tx1"/>
+                </a:solidFill>
+                <a:latin typeface="+mj-lt"/>
+                <a:ea typeface="+mj-ea"/>
+                <a:cs typeface="+mj-cs"/>
+              </a:defRPr>
+            </a:lvl1pPr>
+          </a:lstStyle>
+          <a:p>
+            <a:r>
+              <a:rPr lang="zh-CN" sz="4000" b="1" dirty="0" err="1">
+                <a:solidFill>
+                  <a:srgbClr val="704F95"/>
+                </a:solidFill>
+                <a:latin typeface="思源宋体 Medium" panose="02020500000000000000" pitchFamily="18" charset="-122"/>
+                <a:ea typeface="思源宋体 Medium" panose="02020500000000000000" pitchFamily="18" charset="-122"/>
+              </a:rPr>
+              <a:t>跑通</a:t>
+            </a:r>
+            <a:r>
+              <a:rPr lang="en-US" altLang="zh-CN" sz="4000" b="1" dirty="0" err="1">
+                <a:solidFill>
+                  <a:srgbClr val="704F95"/>
+                </a:solidFill>
+                <a:latin typeface="思源宋体 Medium" panose="02020500000000000000" pitchFamily="18" charset="-122"/>
+                <a:ea typeface="思源宋体 Medium" panose="02020500000000000000" pitchFamily="18" charset="-122"/>
+              </a:rPr>
+              <a:t> Intel </a:t>
+            </a:r>
+            <a:r>
+              <a:rPr lang="zh-CN" altLang="en-US" sz="4000" b="1" dirty="0" err="1">
+                <a:solidFill>
+                  <a:srgbClr val="704F95"/>
+                </a:solidFill>
+                <a:latin typeface="思源宋体 Medium" panose="02020500000000000000" pitchFamily="18" charset="-122"/>
+                <a:ea typeface="思源宋体 Medium" panose="02020500000000000000" pitchFamily="18" charset="-122"/>
+              </a:rPr>
+              <a:t>的</a:t>
+            </a:r>
+            <a:r>
+              <a:rPr lang="en-US" altLang="zh-CN" sz="4000" b="1" dirty="0" err="1">
+                <a:solidFill>
+                  <a:srgbClr val="704F95"/>
+                </a:solidFill>
+                <a:latin typeface="思源宋体 Medium" panose="02020500000000000000" pitchFamily="18" charset="-122"/>
+                <a:ea typeface="思源宋体 Medium" panose="02020500000000000000" pitchFamily="18" charset="-122"/>
+              </a:rPr>
+              <a:t> uintr ipc benchmark</a:t>
+            </a:r>
+            <a:endParaRPr lang="en-US" altLang="zh-CN" sz="4000" b="1" dirty="0" err="1">
+              <a:solidFill>
+                <a:srgbClr val="704F95"/>
+              </a:solidFill>
+              <a:latin typeface="思源宋体 Medium" panose="02020500000000000000" pitchFamily="18" charset="-122"/>
+              <a:ea typeface="思源宋体 Medium" panose="02020500000000000000" pitchFamily="18" charset="-122"/>
+            </a:endParaRPr>
+          </a:p>
+        </p:txBody>
+      </p:sp>
       <p:pic>
         <p:nvPicPr>
           <p:cNvPr id="44" name="Picture 8"/>
@@ -7477,7 +8783,7 @@
           <p:nvPr/>
         </p:nvPicPr>
         <p:blipFill>
-          <a:blip r:embed="rId3">
+          <a:blip r:embed="rId1">
             <a:clrChange>
               <a:clrFrom>
                 <a:srgbClr val="FFFFFF"/>
@@ -7887,36 +9193,7 @@
               <a:rPr lang="zh-CN" altLang="en-US" dirty="0">
                 <a:latin typeface="+mn-ea"/>
               </a:rPr>
-              <a:t>整理汇报内容</a:t>
-            </a:r>
-            <a:endParaRPr lang="en-US" altLang="zh-CN" dirty="0">
-              <a:latin typeface="+mn-ea"/>
-            </a:endParaRPr>
-          </a:p>
-          <a:p>
-            <a:r>
-              <a:rPr lang="zh-CN" altLang="en-US" dirty="0">
-                <a:latin typeface="+mn-ea"/>
-              </a:rPr>
-              <a:t>为</a:t>
-            </a:r>
-            <a:r>
-              <a:rPr lang="en-US" altLang="zh-CN" dirty="0">
-                <a:latin typeface="+mn-ea"/>
-              </a:rPr>
-              <a:t>OS</a:t>
-            </a:r>
-            <a:r>
-              <a:rPr lang="zh-CN" altLang="en-US" dirty="0">
-                <a:latin typeface="+mn-ea"/>
-              </a:rPr>
-              <a:t>做</a:t>
-            </a:r>
-            <a:r>
-              <a:rPr lang="zh-CN" altLang="en-US">
-                <a:latin typeface="+mn-ea"/>
-              </a:rPr>
-              <a:t>规划和准备</a:t>
+              <a:t>取得了初步的性能测试结果</a:t>
             </a:r>
             <a:endParaRPr lang="zh-CN" altLang="en-US" dirty="0">
               <a:latin typeface="+mn-ea"/>
@@ -7924,6 +9201,54 @@
           </a:p>
         </p:txBody>
       </p:sp>
+      <p:pic>
+        <p:nvPicPr>
+          <p:cNvPr id="2" name="图片 1" descr="Screenshot_20220603_231148"/>
+          <p:cNvPicPr>
+            <a:picLocks noChangeAspect="1"/>
+          </p:cNvPicPr>
+          <p:nvPr/>
+        </p:nvPicPr>
+        <p:blipFill>
+          <a:blip r:embed="rId2"/>
+          <a:stretch>
+            <a:fillRect/>
+          </a:stretch>
+        </p:blipFill>
+        <p:spPr>
+          <a:xfrm>
+            <a:off x="501650" y="2352040"/>
+            <a:ext cx="5475605" cy="4057015"/>
+          </a:xfrm>
+          <a:prstGeom prst="rect">
+            <a:avLst/>
+          </a:prstGeom>
+        </p:spPr>
+      </p:pic>
+      <p:pic>
+        <p:nvPicPr>
+          <p:cNvPr id="3" name="图片 2" descr="Screenshot_20220603_231219"/>
+          <p:cNvPicPr>
+            <a:picLocks noChangeAspect="1"/>
+          </p:cNvPicPr>
+          <p:nvPr/>
+        </p:nvPicPr>
+        <p:blipFill>
+          <a:blip r:embed="rId3"/>
+          <a:stretch>
+            <a:fillRect/>
+          </a:stretch>
+        </p:blipFill>
+        <p:spPr>
+          <a:xfrm>
+            <a:off x="6620510" y="2766695"/>
+            <a:ext cx="4680585" cy="3128010"/>
+          </a:xfrm>
+          <a:prstGeom prst="rect">
+            <a:avLst/>
+          </a:prstGeom>
+        </p:spPr>
+      </p:pic>
     </p:spTree>
   </p:cSld>
   <p:clrMapOvr>
@@ -7951,14 +9276,62 @@
       </p:grpSpPr>
       <p:sp>
         <p:nvSpPr>
-          <p:cNvPr id="10" name="内容占位符 2"/>
+          <p:cNvPr id="43" name="Rectangle 236"/>
+          <p:cNvSpPr/>
+          <p:nvPr/>
+        </p:nvSpPr>
+        <p:spPr>
+          <a:xfrm>
+            <a:off x="987616" y="797307"/>
+            <a:ext cx="10395795" cy="923330"/>
+          </a:xfrm>
+          <a:prstGeom prst="rect">
+            <a:avLst/>
+          </a:prstGeom>
+          <a:noFill/>
+        </p:spPr>
+        <p:txBody>
+          <a:bodyPr wrap="none" lIns="91440" tIns="45720" rIns="91440" bIns="45720">
+            <a:spAutoFit/>
+            <a:scene3d>
+              <a:camera prst="orthographicFront"/>
+              <a:lightRig rig="soft" dir="t">
+                <a:rot lat="0" lon="0" rev="15600000"/>
+              </a:lightRig>
+            </a:scene3d>
+            <a:sp3d extrusionH="57150" prstMaterial="softEdge">
+              <a:bevelT w="25400" h="38100"/>
+            </a:sp3d>
+          </a:bodyPr>
+          <a:lstStyle/>
+          <a:p>
+            <a:pPr algn="ctr"/>
+            <a:r>
+              <a:rPr lang="zh-CN" altLang="en-US" sz="5400" b="1" u="sng" dirty="0">
+                <a:solidFill>
+                  <a:srgbClr val="803A87"/>
+                </a:solidFill>
+              </a:rPr>
+              <a:t>                                                               </a:t>
+            </a:r>
+            <a:endParaRPr lang="en-US" altLang="zh-CN" sz="5400" b="1" u="sng" dirty="0">
+              <a:solidFill>
+                <a:srgbClr val="803A87"/>
+              </a:solidFill>
+            </a:endParaRPr>
+          </a:p>
+        </p:txBody>
+      </p:sp>
+      <p:sp>
+        <p:nvSpPr>
+          <p:cNvPr id="11" name="标题 1"/>
           <p:cNvSpPr txBox="1"/>
           <p:nvPr/>
         </p:nvSpPr>
         <p:spPr>
           <a:xfrm>
-            <a:off x="1787831" y="2024290"/>
-            <a:ext cx="8456364" cy="4152673"/>
+            <a:off x="1170269" y="797307"/>
+            <a:ext cx="10030487" cy="961382"/>
           </a:xfrm>
           <a:prstGeom prst="rect">
             <a:avLst/>
@@ -7967,221 +9340,53 @@
         <p:txBody>
           <a:bodyPr/>
           <a:lstStyle>
-            <a:lvl1pPr marL="228600" indent="-228600" algn="l" defTabSz="914400" rtl="0" eaLnBrk="1" latinLnBrk="0" hangingPunct="1">
-              <a:lnSpc>
-                <a:spcPct val="90000"/>
-              </a:lnSpc>
-              <a:spcBef>
-                <a:spcPts val="1000"/>
-              </a:spcBef>
-              <a:buFont typeface="Arial" panose="020B0604020202020204" pitchFamily="34" charset="0"/>
-              <a:buChar char="•"/>
-              <a:defRPr sz="2800" kern="1200">
-                <a:solidFill>
-                  <a:schemeClr val="tx1"/>
-                </a:solidFill>
-                <a:latin typeface="+mn-lt"/>
-                <a:ea typeface="+mn-ea"/>
-                <a:cs typeface="+mn-cs"/>
+            <a:lvl1pPr algn="l" defTabSz="914400" rtl="0" eaLnBrk="1" latinLnBrk="0" hangingPunct="1">
+              <a:lnSpc>
+                <a:spcPct val="90000"/>
+              </a:lnSpc>
+              <a:spcBef>
+                <a:spcPct val="0"/>
+              </a:spcBef>
+              <a:buNone/>
+              <a:defRPr sz="4400" kern="1200">
+                <a:solidFill>
+                  <a:schemeClr val="tx1"/>
+                </a:solidFill>
+                <a:latin typeface="+mj-lt"/>
+                <a:ea typeface="+mj-ea"/>
+                <a:cs typeface="+mj-cs"/>
               </a:defRPr>
             </a:lvl1pPr>
-            <a:lvl2pPr marL="685800" indent="-228600" algn="l" defTabSz="914400" rtl="0" eaLnBrk="1" latinLnBrk="0" hangingPunct="1">
-              <a:lnSpc>
-                <a:spcPct val="90000"/>
-              </a:lnSpc>
-              <a:spcBef>
-                <a:spcPts val="500"/>
-              </a:spcBef>
-              <a:buFont typeface="Arial" panose="020B0604020202020204" pitchFamily="34" charset="0"/>
-              <a:buChar char="•"/>
-              <a:defRPr sz="2400" kern="1200">
-                <a:solidFill>
-                  <a:schemeClr val="tx1"/>
-                </a:solidFill>
-                <a:latin typeface="+mn-lt"/>
-                <a:ea typeface="+mn-ea"/>
-                <a:cs typeface="+mn-cs"/>
-              </a:defRPr>
-            </a:lvl2pPr>
-            <a:lvl3pPr marL="1143000" indent="-228600" algn="l" defTabSz="914400" rtl="0" eaLnBrk="1" latinLnBrk="0" hangingPunct="1">
-              <a:lnSpc>
-                <a:spcPct val="90000"/>
-              </a:lnSpc>
-              <a:spcBef>
-                <a:spcPts val="500"/>
-              </a:spcBef>
-              <a:buFont typeface="Arial" panose="020B0604020202020204" pitchFamily="34" charset="0"/>
-              <a:buChar char="•"/>
-              <a:defRPr sz="2000" kern="1200">
-                <a:solidFill>
-                  <a:schemeClr val="tx1"/>
-                </a:solidFill>
-                <a:latin typeface="+mn-lt"/>
-                <a:ea typeface="+mn-ea"/>
-                <a:cs typeface="+mn-cs"/>
-              </a:defRPr>
-            </a:lvl3pPr>
-            <a:lvl4pPr marL="1600200" indent="-228600" algn="l" defTabSz="914400" rtl="0" eaLnBrk="1" latinLnBrk="0" hangingPunct="1">
-              <a:lnSpc>
-                <a:spcPct val="90000"/>
-              </a:lnSpc>
-              <a:spcBef>
-                <a:spcPts val="500"/>
-              </a:spcBef>
-              <a:buFont typeface="Arial" panose="020B0604020202020204" pitchFamily="34" charset="0"/>
-              <a:buChar char="•"/>
-              <a:defRPr sz="1800" kern="1200">
-                <a:solidFill>
-                  <a:schemeClr val="tx1"/>
-                </a:solidFill>
-                <a:latin typeface="+mn-lt"/>
-                <a:ea typeface="+mn-ea"/>
-                <a:cs typeface="+mn-cs"/>
-              </a:defRPr>
-            </a:lvl4pPr>
-            <a:lvl5pPr marL="2057400" indent="-228600" algn="l" defTabSz="914400" rtl="0" eaLnBrk="1" latinLnBrk="0" hangingPunct="1">
-              <a:lnSpc>
-                <a:spcPct val="90000"/>
-              </a:lnSpc>
-              <a:spcBef>
-                <a:spcPts val="500"/>
-              </a:spcBef>
-              <a:buFont typeface="Arial" panose="020B0604020202020204" pitchFamily="34" charset="0"/>
-              <a:buChar char="•"/>
-              <a:defRPr sz="1800" kern="1200">
-                <a:solidFill>
-                  <a:schemeClr val="tx1"/>
-                </a:solidFill>
-                <a:latin typeface="+mn-lt"/>
-                <a:ea typeface="+mn-ea"/>
-                <a:cs typeface="+mn-cs"/>
-              </a:defRPr>
-            </a:lvl5pPr>
-            <a:lvl6pPr marL="2514600" indent="-228600" algn="l" defTabSz="914400" rtl="0" eaLnBrk="1" latinLnBrk="0" hangingPunct="1">
-              <a:lnSpc>
-                <a:spcPct val="90000"/>
-              </a:lnSpc>
-              <a:spcBef>
-                <a:spcPts val="500"/>
-              </a:spcBef>
-              <a:buFont typeface="Arial" panose="020B0604020202020204" pitchFamily="34" charset="0"/>
-              <a:buChar char="•"/>
-              <a:defRPr sz="1800" kern="1200">
-                <a:solidFill>
-                  <a:schemeClr val="tx1"/>
-                </a:solidFill>
-                <a:latin typeface="+mn-lt"/>
-                <a:ea typeface="+mn-ea"/>
-                <a:cs typeface="+mn-cs"/>
-              </a:defRPr>
-            </a:lvl6pPr>
-            <a:lvl7pPr marL="2971800" indent="-228600" algn="l" defTabSz="914400" rtl="0" eaLnBrk="1" latinLnBrk="0" hangingPunct="1">
-              <a:lnSpc>
-                <a:spcPct val="90000"/>
-              </a:lnSpc>
-              <a:spcBef>
-                <a:spcPts val="500"/>
-              </a:spcBef>
-              <a:buFont typeface="Arial" panose="020B0604020202020204" pitchFamily="34" charset="0"/>
-              <a:buChar char="•"/>
-              <a:defRPr sz="1800" kern="1200">
-                <a:solidFill>
-                  <a:schemeClr val="tx1"/>
-                </a:solidFill>
-                <a:latin typeface="+mn-lt"/>
-                <a:ea typeface="+mn-ea"/>
-                <a:cs typeface="+mn-cs"/>
-              </a:defRPr>
-            </a:lvl7pPr>
-            <a:lvl8pPr marL="3429000" indent="-228600" algn="l" defTabSz="914400" rtl="0" eaLnBrk="1" latinLnBrk="0" hangingPunct="1">
-              <a:lnSpc>
-                <a:spcPct val="90000"/>
-              </a:lnSpc>
-              <a:spcBef>
-                <a:spcPts val="500"/>
-              </a:spcBef>
-              <a:buFont typeface="Arial" panose="020B0604020202020204" pitchFamily="34" charset="0"/>
-              <a:buChar char="•"/>
-              <a:defRPr sz="1800" kern="1200">
-                <a:solidFill>
-                  <a:schemeClr val="tx1"/>
-                </a:solidFill>
-                <a:latin typeface="+mn-lt"/>
-                <a:ea typeface="+mn-ea"/>
-                <a:cs typeface="+mn-cs"/>
-              </a:defRPr>
-            </a:lvl8pPr>
-            <a:lvl9pPr marL="3886200" indent="-228600" algn="l" defTabSz="914400" rtl="0" eaLnBrk="1" latinLnBrk="0" hangingPunct="1">
-              <a:lnSpc>
-                <a:spcPct val="90000"/>
-              </a:lnSpc>
-              <a:spcBef>
-                <a:spcPts val="500"/>
-              </a:spcBef>
-              <a:buFont typeface="Arial" panose="020B0604020202020204" pitchFamily="34" charset="0"/>
-              <a:buChar char="•"/>
-              <a:defRPr sz="1800" kern="1200">
-                <a:solidFill>
-                  <a:schemeClr val="tx1"/>
-                </a:solidFill>
-                <a:latin typeface="+mn-lt"/>
-                <a:ea typeface="+mn-ea"/>
-                <a:cs typeface="+mn-cs"/>
-              </a:defRPr>
-            </a:lvl9pPr>
           </a:lstStyle>
           <a:p>
-            <a:pPr marL="0" indent="0">
-              <a:buNone/>
-            </a:pPr>
-            <a:endParaRPr kumimoji="1" lang="zh-CN" altLang="en-US" dirty="0">
-              <a:solidFill>
-                <a:srgbClr val="FF0000"/>
-              </a:solidFill>
-            </a:endParaRPr>
-          </a:p>
-          <a:p>
-            <a:pPr marL="0" indent="0">
-              <a:buNone/>
-            </a:pPr>
-            <a:endParaRPr kumimoji="1" lang="zh-CN" altLang="en-US" dirty="0">
-              <a:solidFill>
-                <a:srgbClr val="FF0000"/>
-              </a:solidFill>
-            </a:endParaRPr>
-          </a:p>
-          <a:p>
-            <a:pPr marL="0" indent="0" algn="ctr">
-              <a:buNone/>
-            </a:pPr>
-            <a:r>
-              <a:rPr kumimoji="1" lang="zh-CN" altLang="en-US" sz="4400" dirty="0">
+            <a:r>
+              <a:rPr lang="zh-CN" sz="4000" b="1" dirty="0" err="1">
                 <a:solidFill>
                   <a:srgbClr val="704F95"/>
                 </a:solidFill>
-                <a:latin typeface="思源宋体 Heavy" panose="02020900000000000000" pitchFamily="18" charset="-122"/>
-                <a:ea typeface="思源宋体 Heavy" panose="02020900000000000000" pitchFamily="18" charset="-122"/>
+                <a:latin typeface="思源宋体 Medium" panose="02020500000000000000" pitchFamily="18" charset="-122"/>
+                <a:ea typeface="思源宋体 Medium" panose="02020500000000000000" pitchFamily="18" charset="-122"/>
               </a:rPr>
-              <a:t>交流时间</a:t>
-            </a:r>
-            <a:endParaRPr kumimoji="1" lang="en-US" altLang="zh-CN" sz="4400" dirty="0">
+              <a:t>查找性能瓶颈</a:t>
+            </a:r>
+            <a:endParaRPr lang="zh-CN" sz="4000" b="1" dirty="0" err="1">
               <a:solidFill>
                 <a:srgbClr val="704F95"/>
               </a:solidFill>
-              <a:latin typeface="思源宋体 Heavy" panose="02020900000000000000" pitchFamily="18" charset="-122"/>
-              <a:ea typeface="思源宋体 Heavy" panose="02020900000000000000" pitchFamily="18" charset="-122"/>
+              <a:latin typeface="思源宋体 Medium" panose="02020500000000000000" pitchFamily="18" charset="-122"/>
+              <a:ea typeface="思源宋体 Medium" panose="02020500000000000000" pitchFamily="18" charset="-122"/>
             </a:endParaRPr>
           </a:p>
         </p:txBody>
       </p:sp>
       <p:pic>
         <p:nvPicPr>
-          <p:cNvPr id="8" name="Picture 8"/>
+          <p:cNvPr id="44" name="Picture 8"/>
           <p:cNvPicPr/>
           <p:nvPr/>
         </p:nvPicPr>
         <p:blipFill>
-          <a:blip r:embed="rId3">
+          <a:blip r:embed="rId1">
             <a:clrChange>
               <a:clrFrom>
                 <a:srgbClr val="FFFFFF"/>
@@ -8209,13 +9414,519 @@
       </p:pic>
       <p:sp>
         <p:nvSpPr>
-          <p:cNvPr id="5" name="Rectangle 236"/>
+          <p:cNvPr id="8" name="文本占位符 1"/>
+          <p:cNvSpPr txBox="1"/>
+          <p:nvPr/>
+        </p:nvSpPr>
+        <p:spPr>
+          <a:xfrm>
+            <a:off x="6371771" y="263796"/>
+            <a:ext cx="5629085" cy="328059"/>
+          </a:xfrm>
+          <a:prstGeom prst="rect">
+            <a:avLst/>
+          </a:prstGeom>
+          <a:ln w="12700" cmpd="sng">
+            <a:noFill/>
+          </a:ln>
+        </p:spPr>
+        <p:txBody>
+          <a:bodyPr vert="horz" anchor="ctr"/>
+          <a:lstStyle>
+            <a:lvl1pPr marL="0" indent="0" algn="l" defTabSz="914400" rtl="0" eaLnBrk="1" latinLnBrk="0" hangingPunct="1">
+              <a:lnSpc>
+                <a:spcPct val="90000"/>
+              </a:lnSpc>
+              <a:spcBef>
+                <a:spcPts val="1000"/>
+              </a:spcBef>
+              <a:buFont typeface="Arial" panose="020B0604020202020204" pitchFamily="34" charset="0"/>
+              <a:buNone/>
+              <a:defRPr sz="1400" b="1" kern="1200">
+                <a:solidFill>
+                  <a:schemeClr val="tx1"/>
+                </a:solidFill>
+                <a:latin typeface="微软雅黑" charset="0"/>
+                <a:ea typeface="微软雅黑" charset="0"/>
+                <a:cs typeface="微软雅黑" charset="0"/>
+              </a:defRPr>
+            </a:lvl1pPr>
+            <a:lvl2pPr marL="685800" indent="-228600" algn="l" defTabSz="914400" rtl="0" eaLnBrk="1" latinLnBrk="0" hangingPunct="1">
+              <a:lnSpc>
+                <a:spcPct val="90000"/>
+              </a:lnSpc>
+              <a:spcBef>
+                <a:spcPts val="500"/>
+              </a:spcBef>
+              <a:buFont typeface="Arial" panose="020B0604020202020204" pitchFamily="34" charset="0"/>
+              <a:buChar char="•"/>
+              <a:defRPr sz="2400" kern="1200">
+                <a:solidFill>
+                  <a:schemeClr val="tx1"/>
+                </a:solidFill>
+                <a:latin typeface="+mn-lt"/>
+                <a:ea typeface="+mn-ea"/>
+                <a:cs typeface="+mn-cs"/>
+              </a:defRPr>
+            </a:lvl2pPr>
+            <a:lvl3pPr marL="1143000" indent="-228600" algn="l" defTabSz="914400" rtl="0" eaLnBrk="1" latinLnBrk="0" hangingPunct="1">
+              <a:lnSpc>
+                <a:spcPct val="90000"/>
+              </a:lnSpc>
+              <a:spcBef>
+                <a:spcPts val="500"/>
+              </a:spcBef>
+              <a:buFont typeface="Arial" panose="020B0604020202020204" pitchFamily="34" charset="0"/>
+              <a:buChar char="•"/>
+              <a:defRPr sz="2000" kern="1200">
+                <a:solidFill>
+                  <a:schemeClr val="tx1"/>
+                </a:solidFill>
+                <a:latin typeface="+mn-lt"/>
+                <a:ea typeface="+mn-ea"/>
+                <a:cs typeface="+mn-cs"/>
+              </a:defRPr>
+            </a:lvl3pPr>
+            <a:lvl4pPr marL="1600200" indent="-228600" algn="l" defTabSz="914400" rtl="0" eaLnBrk="1" latinLnBrk="0" hangingPunct="1">
+              <a:lnSpc>
+                <a:spcPct val="90000"/>
+              </a:lnSpc>
+              <a:spcBef>
+                <a:spcPts val="500"/>
+              </a:spcBef>
+              <a:buFont typeface="Arial" panose="020B0604020202020204" pitchFamily="34" charset="0"/>
+              <a:buChar char="•"/>
+              <a:defRPr sz="1800" kern="1200">
+                <a:solidFill>
+                  <a:schemeClr val="tx1"/>
+                </a:solidFill>
+                <a:latin typeface="+mn-lt"/>
+                <a:ea typeface="+mn-ea"/>
+                <a:cs typeface="+mn-cs"/>
+              </a:defRPr>
+            </a:lvl4pPr>
+            <a:lvl5pPr marL="2057400" indent="-228600" algn="l" defTabSz="914400" rtl="0" eaLnBrk="1" latinLnBrk="0" hangingPunct="1">
+              <a:lnSpc>
+                <a:spcPct val="90000"/>
+              </a:lnSpc>
+              <a:spcBef>
+                <a:spcPts val="500"/>
+              </a:spcBef>
+              <a:buFont typeface="Arial" panose="020B0604020202020204" pitchFamily="34" charset="0"/>
+              <a:buChar char="•"/>
+              <a:defRPr sz="1800" kern="1200">
+                <a:solidFill>
+                  <a:schemeClr val="tx1"/>
+                </a:solidFill>
+                <a:latin typeface="+mn-lt"/>
+                <a:ea typeface="+mn-ea"/>
+                <a:cs typeface="+mn-cs"/>
+              </a:defRPr>
+            </a:lvl5pPr>
+            <a:lvl6pPr marL="2514600" indent="-228600" algn="l" defTabSz="914400" rtl="0" eaLnBrk="1" latinLnBrk="0" hangingPunct="1">
+              <a:lnSpc>
+                <a:spcPct val="90000"/>
+              </a:lnSpc>
+              <a:spcBef>
+                <a:spcPts val="500"/>
+              </a:spcBef>
+              <a:buFont typeface="Arial" panose="020B0604020202020204" pitchFamily="34" charset="0"/>
+              <a:buChar char="•"/>
+              <a:defRPr sz="1800" kern="1200">
+                <a:solidFill>
+                  <a:schemeClr val="tx1"/>
+                </a:solidFill>
+                <a:latin typeface="+mn-lt"/>
+                <a:ea typeface="+mn-ea"/>
+                <a:cs typeface="+mn-cs"/>
+              </a:defRPr>
+            </a:lvl6pPr>
+            <a:lvl7pPr marL="2971800" indent="-228600" algn="l" defTabSz="914400" rtl="0" eaLnBrk="1" latinLnBrk="0" hangingPunct="1">
+              <a:lnSpc>
+                <a:spcPct val="90000"/>
+              </a:lnSpc>
+              <a:spcBef>
+                <a:spcPts val="500"/>
+              </a:spcBef>
+              <a:buFont typeface="Arial" panose="020B0604020202020204" pitchFamily="34" charset="0"/>
+              <a:buChar char="•"/>
+              <a:defRPr sz="1800" kern="1200">
+                <a:solidFill>
+                  <a:schemeClr val="tx1"/>
+                </a:solidFill>
+                <a:latin typeface="+mn-lt"/>
+                <a:ea typeface="+mn-ea"/>
+                <a:cs typeface="+mn-cs"/>
+              </a:defRPr>
+            </a:lvl7pPr>
+            <a:lvl8pPr marL="3429000" indent="-228600" algn="l" defTabSz="914400" rtl="0" eaLnBrk="1" latinLnBrk="0" hangingPunct="1">
+              <a:lnSpc>
+                <a:spcPct val="90000"/>
+              </a:lnSpc>
+              <a:spcBef>
+                <a:spcPts val="500"/>
+              </a:spcBef>
+              <a:buFont typeface="Arial" panose="020B0604020202020204" pitchFamily="34" charset="0"/>
+              <a:buChar char="•"/>
+              <a:defRPr sz="1800" kern="1200">
+                <a:solidFill>
+                  <a:schemeClr val="tx1"/>
+                </a:solidFill>
+                <a:latin typeface="+mn-lt"/>
+                <a:ea typeface="+mn-ea"/>
+                <a:cs typeface="+mn-cs"/>
+              </a:defRPr>
+            </a:lvl8pPr>
+            <a:lvl9pPr marL="3886200" indent="-228600" algn="l" defTabSz="914400" rtl="0" eaLnBrk="1" latinLnBrk="0" hangingPunct="1">
+              <a:lnSpc>
+                <a:spcPct val="90000"/>
+              </a:lnSpc>
+              <a:spcBef>
+                <a:spcPts val="500"/>
+              </a:spcBef>
+              <a:buFont typeface="Arial" panose="020B0604020202020204" pitchFamily="34" charset="0"/>
+              <a:buChar char="•"/>
+              <a:defRPr sz="1800" kern="1200">
+                <a:solidFill>
+                  <a:schemeClr val="tx1"/>
+                </a:solidFill>
+                <a:latin typeface="+mn-lt"/>
+                <a:ea typeface="+mn-ea"/>
+                <a:cs typeface="+mn-cs"/>
+              </a:defRPr>
+            </a:lvl9pPr>
+          </a:lstStyle>
+          <a:p>
+            <a:pPr algn="r"/>
+            <a:endParaRPr lang="en-US" altLang="zh-CN" dirty="0">
+              <a:solidFill>
+                <a:srgbClr val="704F95"/>
+              </a:solidFill>
+              <a:latin typeface="思源宋体 Medium" panose="02020500000000000000" pitchFamily="18" charset="-122"/>
+              <a:ea typeface="思源宋体 Medium" panose="02020500000000000000" pitchFamily="18" charset="-122"/>
+            </a:endParaRPr>
+          </a:p>
+        </p:txBody>
+      </p:sp>
+      <p:sp>
+        <p:nvSpPr>
+          <p:cNvPr id="6" name="Content Placeholder 2"/>
+          <p:cNvSpPr txBox="1"/>
+          <p:nvPr/>
+        </p:nvSpPr>
+        <p:spPr>
+          <a:xfrm>
+            <a:off x="1113971" y="1801282"/>
+            <a:ext cx="10515600" cy="4351338"/>
+          </a:xfrm>
+          <a:prstGeom prst="rect">
+            <a:avLst/>
+          </a:prstGeom>
+        </p:spPr>
+        <p:txBody>
+          <a:bodyPr>
+            <a:normAutofit/>
+          </a:bodyPr>
+          <a:lstStyle>
+            <a:lvl1pPr marL="228600" indent="-228600" algn="l" defTabSz="914400" rtl="0" eaLnBrk="1" latinLnBrk="0" hangingPunct="1">
+              <a:lnSpc>
+                <a:spcPct val="90000"/>
+              </a:lnSpc>
+              <a:spcBef>
+                <a:spcPts val="1000"/>
+              </a:spcBef>
+              <a:buFont typeface="Arial" panose="020B0604020202020204" pitchFamily="34" charset="0"/>
+              <a:buChar char="•"/>
+              <a:defRPr sz="2800" kern="1200">
+                <a:solidFill>
+                  <a:schemeClr val="tx1"/>
+                </a:solidFill>
+                <a:latin typeface="+mn-lt"/>
+                <a:ea typeface="+mn-ea"/>
+                <a:cs typeface="+mn-cs"/>
+              </a:defRPr>
+            </a:lvl1pPr>
+            <a:lvl2pPr marL="685800" indent="-228600" algn="l" defTabSz="914400" rtl="0" eaLnBrk="1" latinLnBrk="0" hangingPunct="1">
+              <a:lnSpc>
+                <a:spcPct val="90000"/>
+              </a:lnSpc>
+              <a:spcBef>
+                <a:spcPts val="500"/>
+              </a:spcBef>
+              <a:buFont typeface="Arial" panose="020B0604020202020204" pitchFamily="34" charset="0"/>
+              <a:buChar char="•"/>
+              <a:defRPr sz="2400" kern="1200">
+                <a:solidFill>
+                  <a:schemeClr val="tx1"/>
+                </a:solidFill>
+                <a:latin typeface="+mn-lt"/>
+                <a:ea typeface="+mn-ea"/>
+                <a:cs typeface="+mn-cs"/>
+              </a:defRPr>
+            </a:lvl2pPr>
+            <a:lvl3pPr marL="1143000" indent="-228600" algn="l" defTabSz="914400" rtl="0" eaLnBrk="1" latinLnBrk="0" hangingPunct="1">
+              <a:lnSpc>
+                <a:spcPct val="90000"/>
+              </a:lnSpc>
+              <a:spcBef>
+                <a:spcPts val="500"/>
+              </a:spcBef>
+              <a:buFont typeface="Arial" panose="020B0604020202020204" pitchFamily="34" charset="0"/>
+              <a:buChar char="•"/>
+              <a:defRPr sz="2000" kern="1200">
+                <a:solidFill>
+                  <a:schemeClr val="tx1"/>
+                </a:solidFill>
+                <a:latin typeface="+mn-lt"/>
+                <a:ea typeface="+mn-ea"/>
+                <a:cs typeface="+mn-cs"/>
+              </a:defRPr>
+            </a:lvl3pPr>
+            <a:lvl4pPr marL="1600200" indent="-228600" algn="l" defTabSz="914400" rtl="0" eaLnBrk="1" latinLnBrk="0" hangingPunct="1">
+              <a:lnSpc>
+                <a:spcPct val="90000"/>
+              </a:lnSpc>
+              <a:spcBef>
+                <a:spcPts val="500"/>
+              </a:spcBef>
+              <a:buFont typeface="Arial" panose="020B0604020202020204" pitchFamily="34" charset="0"/>
+              <a:buChar char="•"/>
+              <a:defRPr sz="1800" kern="1200">
+                <a:solidFill>
+                  <a:schemeClr val="tx1"/>
+                </a:solidFill>
+                <a:latin typeface="+mn-lt"/>
+                <a:ea typeface="+mn-ea"/>
+                <a:cs typeface="+mn-cs"/>
+              </a:defRPr>
+            </a:lvl4pPr>
+            <a:lvl5pPr marL="2057400" indent="-228600" algn="l" defTabSz="914400" rtl="0" eaLnBrk="1" latinLnBrk="0" hangingPunct="1">
+              <a:lnSpc>
+                <a:spcPct val="90000"/>
+              </a:lnSpc>
+              <a:spcBef>
+                <a:spcPts val="500"/>
+              </a:spcBef>
+              <a:buFont typeface="Arial" panose="020B0604020202020204" pitchFamily="34" charset="0"/>
+              <a:buChar char="•"/>
+              <a:defRPr sz="1800" kern="1200">
+                <a:solidFill>
+                  <a:schemeClr val="tx1"/>
+                </a:solidFill>
+                <a:latin typeface="+mn-lt"/>
+                <a:ea typeface="+mn-ea"/>
+                <a:cs typeface="+mn-cs"/>
+              </a:defRPr>
+            </a:lvl5pPr>
+            <a:lvl6pPr marL="2514600" indent="-228600" algn="l" defTabSz="914400" rtl="0" eaLnBrk="1" latinLnBrk="0" hangingPunct="1">
+              <a:lnSpc>
+                <a:spcPct val="90000"/>
+              </a:lnSpc>
+              <a:spcBef>
+                <a:spcPts val="500"/>
+              </a:spcBef>
+              <a:buFont typeface="Arial" panose="020B0604020202020204" pitchFamily="34" charset="0"/>
+              <a:buChar char="•"/>
+              <a:defRPr sz="1800" kern="1200">
+                <a:solidFill>
+                  <a:schemeClr val="tx1"/>
+                </a:solidFill>
+                <a:latin typeface="+mn-lt"/>
+                <a:ea typeface="+mn-ea"/>
+                <a:cs typeface="+mn-cs"/>
+              </a:defRPr>
+            </a:lvl6pPr>
+            <a:lvl7pPr marL="2971800" indent="-228600" algn="l" defTabSz="914400" rtl="0" eaLnBrk="1" latinLnBrk="0" hangingPunct="1">
+              <a:lnSpc>
+                <a:spcPct val="90000"/>
+              </a:lnSpc>
+              <a:spcBef>
+                <a:spcPts val="500"/>
+              </a:spcBef>
+              <a:buFont typeface="Arial" panose="020B0604020202020204" pitchFamily="34" charset="0"/>
+              <a:buChar char="•"/>
+              <a:defRPr sz="1800" kern="1200">
+                <a:solidFill>
+                  <a:schemeClr val="tx1"/>
+                </a:solidFill>
+                <a:latin typeface="+mn-lt"/>
+                <a:ea typeface="+mn-ea"/>
+                <a:cs typeface="+mn-cs"/>
+              </a:defRPr>
+            </a:lvl7pPr>
+            <a:lvl8pPr marL="3429000" indent="-228600" algn="l" defTabSz="914400" rtl="0" eaLnBrk="1" latinLnBrk="0" hangingPunct="1">
+              <a:lnSpc>
+                <a:spcPct val="90000"/>
+              </a:lnSpc>
+              <a:spcBef>
+                <a:spcPts val="500"/>
+              </a:spcBef>
+              <a:buFont typeface="Arial" panose="020B0604020202020204" pitchFamily="34" charset="0"/>
+              <a:buChar char="•"/>
+              <a:defRPr sz="1800" kern="1200">
+                <a:solidFill>
+                  <a:schemeClr val="tx1"/>
+                </a:solidFill>
+                <a:latin typeface="+mn-lt"/>
+                <a:ea typeface="+mn-ea"/>
+                <a:cs typeface="+mn-cs"/>
+              </a:defRPr>
+            </a:lvl8pPr>
+            <a:lvl9pPr marL="3886200" indent="-228600" algn="l" defTabSz="914400" rtl="0" eaLnBrk="1" latinLnBrk="0" hangingPunct="1">
+              <a:lnSpc>
+                <a:spcPct val="90000"/>
+              </a:lnSpc>
+              <a:spcBef>
+                <a:spcPts val="500"/>
+              </a:spcBef>
+              <a:buFont typeface="Arial" panose="020B0604020202020204" pitchFamily="34" charset="0"/>
+              <a:buChar char="•"/>
+              <a:defRPr sz="1800" kern="1200">
+                <a:solidFill>
+                  <a:schemeClr val="tx1"/>
+                </a:solidFill>
+                <a:latin typeface="+mn-lt"/>
+                <a:ea typeface="+mn-ea"/>
+                <a:cs typeface="+mn-cs"/>
+              </a:defRPr>
+            </a:lvl9pPr>
+          </a:lstStyle>
+          <a:p>
+            <a:r>
+              <a:rPr lang="zh-CN" dirty="0">
+                <a:latin typeface="+mn-ea"/>
+              </a:rPr>
+              <a:t>在</a:t>
+            </a:r>
+            <a:r>
+              <a:rPr lang="en-US" altLang="zh-CN" dirty="0">
+                <a:latin typeface="+mn-ea"/>
+              </a:rPr>
+              <a:t> qemu </a:t>
+            </a:r>
+            <a:r>
+              <a:rPr lang="zh-CN" altLang="en-US" dirty="0">
+                <a:latin typeface="+mn-ea"/>
+              </a:rPr>
+              <a:t>中</a:t>
+            </a:r>
+            <a:r>
+              <a:rPr lang="zh-CN" dirty="0">
+                <a:latin typeface="+mn-ea"/>
+              </a:rPr>
+              <a:t>测量</a:t>
+            </a:r>
+            <a:r>
+              <a:rPr lang="en-US" altLang="zh-CN" dirty="0">
+                <a:latin typeface="+mn-ea"/>
+              </a:rPr>
+              <a:t> </a:t>
+            </a:r>
+            <a:r>
+              <a:rPr lang="zh-CN" altLang="en-US" dirty="0">
+                <a:latin typeface="+mn-ea"/>
+              </a:rPr>
+              <a:t>发出中断</a:t>
+            </a:r>
+            <a:r>
+              <a:rPr lang="en-US" altLang="zh-CN" dirty="0">
+                <a:latin typeface="+mn-ea"/>
+              </a:rPr>
+              <a:t>-</a:t>
+            </a:r>
+            <a:r>
+              <a:rPr lang="zh-CN" altLang="en-US" dirty="0">
+                <a:latin typeface="+mn-ea"/>
+              </a:rPr>
+              <a:t>响应中断</a:t>
+            </a:r>
+            <a:r>
+              <a:rPr lang="en-US" altLang="zh-CN" dirty="0">
+                <a:latin typeface="+mn-ea"/>
+              </a:rPr>
+              <a:t> </a:t>
+            </a:r>
+            <a:r>
+              <a:rPr lang="zh-CN" altLang="en-US" dirty="0">
+                <a:latin typeface="+mn-ea"/>
+              </a:rPr>
+              <a:t>的耗时</a:t>
+            </a:r>
+            <a:endParaRPr lang="zh-CN" altLang="en-US" dirty="0">
+              <a:latin typeface="+mn-ea"/>
+            </a:endParaRPr>
+          </a:p>
+          <a:p>
+            <a:r>
+              <a:rPr lang="zh-CN" altLang="en-US" dirty="0">
+                <a:latin typeface="+mn-ea"/>
+              </a:rPr>
+              <a:t>发现这是主要的性能瓶颈</a:t>
+            </a:r>
+            <a:endParaRPr lang="zh-CN" altLang="en-US" dirty="0">
+              <a:latin typeface="+mn-ea"/>
+            </a:endParaRPr>
+          </a:p>
+        </p:txBody>
+      </p:sp>
+      <p:pic>
+        <p:nvPicPr>
+          <p:cNvPr id="5" name="图片 4"/>
+          <p:cNvPicPr>
+            <a:picLocks noChangeAspect="1"/>
+          </p:cNvPicPr>
+          <p:nvPr/>
+        </p:nvPicPr>
+        <p:blipFill>
+          <a:blip r:embed="rId2"/>
+          <a:stretch>
+            <a:fillRect/>
+          </a:stretch>
+        </p:blipFill>
+        <p:spPr>
+          <a:xfrm>
+            <a:off x="2562860" y="2883535"/>
+            <a:ext cx="5949950" cy="3554095"/>
+          </a:xfrm>
+          <a:prstGeom prst="rect">
+            <a:avLst/>
+          </a:prstGeom>
+        </p:spPr>
+      </p:pic>
+    </p:spTree>
+  </p:cSld>
+  <p:clrMapOvr>
+    <a:masterClrMapping/>
+  </p:clrMapOvr>
+</p:sld>
+</file>
+
+<file path=ppt/slides/slide9.xml><?xml version="1.0" encoding="utf-8"?>
+<p:sld xmlns:a="http://schemas.openxmlformats.org/drawingml/2006/main" xmlns:r="http://schemas.openxmlformats.org/officeDocument/2006/relationships" xmlns:p="http://schemas.openxmlformats.org/presentationml/2006/main">
+  <p:cSld>
+    <p:spTree>
+      <p:nvGrpSpPr>
+        <p:cNvPr id="1" name=""/>
+        <p:cNvGrpSpPr/>
+        <p:nvPr/>
+      </p:nvGrpSpPr>
+      <p:grpSpPr>
+        <a:xfrm>
+          <a:off x="0" y="0"/>
+          <a:ext cx="0" cy="0"/>
+          <a:chOff x="0" y="0"/>
+          <a:chExt cx="0" cy="0"/>
+        </a:xfrm>
+      </p:grpSpPr>
+      <p:sp>
+        <p:nvSpPr>
+          <p:cNvPr id="43" name="Rectangle 236"/>
           <p:cNvSpPr/>
           <p:nvPr/>
         </p:nvSpPr>
         <p:spPr>
           <a:xfrm>
-            <a:off x="880107" y="752160"/>
+            <a:off x="987616" y="797307"/>
             <a:ext cx="10395795" cy="923330"/>
           </a:xfrm>
           <a:prstGeom prst="rect">
@@ -8240,7 +9951,7 @@
           <a:p>
             <a:pPr algn="ctr"/>
             <a:r>
-              <a:rPr lang="zh-CN" altLang="en-US" sz="5400" b="1" u="sng">
+              <a:rPr lang="zh-CN" altLang="en-US" sz="5400" b="1" u="sng" dirty="0">
                 <a:solidFill>
                   <a:srgbClr val="803A87"/>
                 </a:solidFill>
@@ -8255,58 +9966,595 @@
           </a:p>
         </p:txBody>
       </p:sp>
+      <p:sp>
+        <p:nvSpPr>
+          <p:cNvPr id="11" name="标题 1"/>
+          <p:cNvSpPr txBox="1"/>
+          <p:nvPr/>
+        </p:nvSpPr>
+        <p:spPr>
+          <a:xfrm>
+            <a:off x="1170269" y="797307"/>
+            <a:ext cx="10030487" cy="961382"/>
+          </a:xfrm>
+          <a:prstGeom prst="rect">
+            <a:avLst/>
+          </a:prstGeom>
+        </p:spPr>
+        <p:txBody>
+          <a:bodyPr/>
+          <a:lstStyle>
+            <a:lvl1pPr algn="l" defTabSz="914400" rtl="0" eaLnBrk="1" latinLnBrk="0" hangingPunct="1">
+              <a:lnSpc>
+                <a:spcPct val="90000"/>
+              </a:lnSpc>
+              <a:spcBef>
+                <a:spcPct val="0"/>
+              </a:spcBef>
+              <a:buNone/>
+              <a:defRPr sz="4400" kern="1200">
+                <a:solidFill>
+                  <a:schemeClr val="tx1"/>
+                </a:solidFill>
+                <a:latin typeface="+mj-lt"/>
+                <a:ea typeface="+mj-ea"/>
+                <a:cs typeface="+mj-cs"/>
+              </a:defRPr>
+            </a:lvl1pPr>
+          </a:lstStyle>
+          <a:p>
+            <a:r>
+              <a:rPr lang="zh-CN" sz="4000" b="1" dirty="0" err="1">
+                <a:solidFill>
+                  <a:srgbClr val="704F95"/>
+                </a:solidFill>
+                <a:latin typeface="思源宋体 Medium" panose="02020500000000000000" pitchFamily="18" charset="-122"/>
+                <a:ea typeface="思源宋体 Medium" panose="02020500000000000000" pitchFamily="18" charset="-122"/>
+              </a:rPr>
+              <a:t>查找性能瓶颈</a:t>
+            </a:r>
+            <a:endParaRPr lang="zh-CN" sz="4000" b="1" dirty="0" err="1">
+              <a:solidFill>
+                <a:srgbClr val="704F95"/>
+              </a:solidFill>
+              <a:latin typeface="思源宋体 Medium" panose="02020500000000000000" pitchFamily="18" charset="-122"/>
+              <a:ea typeface="思源宋体 Medium" panose="02020500000000000000" pitchFamily="18" charset="-122"/>
+            </a:endParaRPr>
+          </a:p>
+        </p:txBody>
+      </p:sp>
       <p:pic>
         <p:nvPicPr>
-          <p:cNvPr id="11" name="图片 3"/>
+          <p:cNvPr id="44" name="Picture 8"/>
+          <p:cNvPicPr/>
+          <p:nvPr/>
+        </p:nvPicPr>
+        <p:blipFill>
+          <a:blip r:embed="rId1">
+            <a:clrChange>
+              <a:clrFrom>
+                <a:srgbClr val="FFFFFF"/>
+              </a:clrFrom>
+              <a:clrTo>
+                <a:srgbClr val="FFFFFF">
+                  <a:alpha val="0"/>
+                </a:srgbClr>
+              </a:clrTo>
+            </a:clrChange>
+          </a:blip>
+          <a:stretch>
+            <a:fillRect/>
+          </a:stretch>
+        </p:blipFill>
+        <p:spPr>
+          <a:xfrm>
+            <a:off x="7880269" y="6297384"/>
+            <a:ext cx="4120587" cy="514122"/>
+          </a:xfrm>
+          <a:prstGeom prst="rect">
+            <a:avLst/>
+          </a:prstGeom>
+        </p:spPr>
+      </p:pic>
+      <p:sp>
+        <p:nvSpPr>
+          <p:cNvPr id="8" name="文本占位符 1"/>
+          <p:cNvSpPr txBox="1"/>
+          <p:nvPr/>
+        </p:nvSpPr>
+        <p:spPr>
+          <a:xfrm>
+            <a:off x="6371771" y="263796"/>
+            <a:ext cx="5629085" cy="328059"/>
+          </a:xfrm>
+          <a:prstGeom prst="rect">
+            <a:avLst/>
+          </a:prstGeom>
+          <a:ln w="12700" cmpd="sng">
+            <a:noFill/>
+          </a:ln>
+        </p:spPr>
+        <p:txBody>
+          <a:bodyPr vert="horz" anchor="ctr"/>
+          <a:lstStyle>
+            <a:lvl1pPr marL="0" indent="0" algn="l" defTabSz="914400" rtl="0" eaLnBrk="1" latinLnBrk="0" hangingPunct="1">
+              <a:lnSpc>
+                <a:spcPct val="90000"/>
+              </a:lnSpc>
+              <a:spcBef>
+                <a:spcPts val="1000"/>
+              </a:spcBef>
+              <a:buFont typeface="Arial" panose="020B0604020202020204" pitchFamily="34" charset="0"/>
+              <a:buNone/>
+              <a:defRPr sz="1400" b="1" kern="1200">
+                <a:solidFill>
+                  <a:schemeClr val="tx1"/>
+                </a:solidFill>
+                <a:latin typeface="微软雅黑" charset="0"/>
+                <a:ea typeface="微软雅黑" charset="0"/>
+                <a:cs typeface="微软雅黑" charset="0"/>
+              </a:defRPr>
+            </a:lvl1pPr>
+            <a:lvl2pPr marL="685800" indent="-228600" algn="l" defTabSz="914400" rtl="0" eaLnBrk="1" latinLnBrk="0" hangingPunct="1">
+              <a:lnSpc>
+                <a:spcPct val="90000"/>
+              </a:lnSpc>
+              <a:spcBef>
+                <a:spcPts val="500"/>
+              </a:spcBef>
+              <a:buFont typeface="Arial" panose="020B0604020202020204" pitchFamily="34" charset="0"/>
+              <a:buChar char="•"/>
+              <a:defRPr sz="2400" kern="1200">
+                <a:solidFill>
+                  <a:schemeClr val="tx1"/>
+                </a:solidFill>
+                <a:latin typeface="+mn-lt"/>
+                <a:ea typeface="+mn-ea"/>
+                <a:cs typeface="+mn-cs"/>
+              </a:defRPr>
+            </a:lvl2pPr>
+            <a:lvl3pPr marL="1143000" indent="-228600" algn="l" defTabSz="914400" rtl="0" eaLnBrk="1" latinLnBrk="0" hangingPunct="1">
+              <a:lnSpc>
+                <a:spcPct val="90000"/>
+              </a:lnSpc>
+              <a:spcBef>
+                <a:spcPts val="500"/>
+              </a:spcBef>
+              <a:buFont typeface="Arial" panose="020B0604020202020204" pitchFamily="34" charset="0"/>
+              <a:buChar char="•"/>
+              <a:defRPr sz="2000" kern="1200">
+                <a:solidFill>
+                  <a:schemeClr val="tx1"/>
+                </a:solidFill>
+                <a:latin typeface="+mn-lt"/>
+                <a:ea typeface="+mn-ea"/>
+                <a:cs typeface="+mn-cs"/>
+              </a:defRPr>
+            </a:lvl3pPr>
+            <a:lvl4pPr marL="1600200" indent="-228600" algn="l" defTabSz="914400" rtl="0" eaLnBrk="1" latinLnBrk="0" hangingPunct="1">
+              <a:lnSpc>
+                <a:spcPct val="90000"/>
+              </a:lnSpc>
+              <a:spcBef>
+                <a:spcPts val="500"/>
+              </a:spcBef>
+              <a:buFont typeface="Arial" panose="020B0604020202020204" pitchFamily="34" charset="0"/>
+              <a:buChar char="•"/>
+              <a:defRPr sz="1800" kern="1200">
+                <a:solidFill>
+                  <a:schemeClr val="tx1"/>
+                </a:solidFill>
+                <a:latin typeface="+mn-lt"/>
+                <a:ea typeface="+mn-ea"/>
+                <a:cs typeface="+mn-cs"/>
+              </a:defRPr>
+            </a:lvl4pPr>
+            <a:lvl5pPr marL="2057400" indent="-228600" algn="l" defTabSz="914400" rtl="0" eaLnBrk="1" latinLnBrk="0" hangingPunct="1">
+              <a:lnSpc>
+                <a:spcPct val="90000"/>
+              </a:lnSpc>
+              <a:spcBef>
+                <a:spcPts val="500"/>
+              </a:spcBef>
+              <a:buFont typeface="Arial" panose="020B0604020202020204" pitchFamily="34" charset="0"/>
+              <a:buChar char="•"/>
+              <a:defRPr sz="1800" kern="1200">
+                <a:solidFill>
+                  <a:schemeClr val="tx1"/>
+                </a:solidFill>
+                <a:latin typeface="+mn-lt"/>
+                <a:ea typeface="+mn-ea"/>
+                <a:cs typeface="+mn-cs"/>
+              </a:defRPr>
+            </a:lvl5pPr>
+            <a:lvl6pPr marL="2514600" indent="-228600" algn="l" defTabSz="914400" rtl="0" eaLnBrk="1" latinLnBrk="0" hangingPunct="1">
+              <a:lnSpc>
+                <a:spcPct val="90000"/>
+              </a:lnSpc>
+              <a:spcBef>
+                <a:spcPts val="500"/>
+              </a:spcBef>
+              <a:buFont typeface="Arial" panose="020B0604020202020204" pitchFamily="34" charset="0"/>
+              <a:buChar char="•"/>
+              <a:defRPr sz="1800" kern="1200">
+                <a:solidFill>
+                  <a:schemeClr val="tx1"/>
+                </a:solidFill>
+                <a:latin typeface="+mn-lt"/>
+                <a:ea typeface="+mn-ea"/>
+                <a:cs typeface="+mn-cs"/>
+              </a:defRPr>
+            </a:lvl6pPr>
+            <a:lvl7pPr marL="2971800" indent="-228600" algn="l" defTabSz="914400" rtl="0" eaLnBrk="1" latinLnBrk="0" hangingPunct="1">
+              <a:lnSpc>
+                <a:spcPct val="90000"/>
+              </a:lnSpc>
+              <a:spcBef>
+                <a:spcPts val="500"/>
+              </a:spcBef>
+              <a:buFont typeface="Arial" panose="020B0604020202020204" pitchFamily="34" charset="0"/>
+              <a:buChar char="•"/>
+              <a:defRPr sz="1800" kern="1200">
+                <a:solidFill>
+                  <a:schemeClr val="tx1"/>
+                </a:solidFill>
+                <a:latin typeface="+mn-lt"/>
+                <a:ea typeface="+mn-ea"/>
+                <a:cs typeface="+mn-cs"/>
+              </a:defRPr>
+            </a:lvl7pPr>
+            <a:lvl8pPr marL="3429000" indent="-228600" algn="l" defTabSz="914400" rtl="0" eaLnBrk="1" latinLnBrk="0" hangingPunct="1">
+              <a:lnSpc>
+                <a:spcPct val="90000"/>
+              </a:lnSpc>
+              <a:spcBef>
+                <a:spcPts val="500"/>
+              </a:spcBef>
+              <a:buFont typeface="Arial" panose="020B0604020202020204" pitchFamily="34" charset="0"/>
+              <a:buChar char="•"/>
+              <a:defRPr sz="1800" kern="1200">
+                <a:solidFill>
+                  <a:schemeClr val="tx1"/>
+                </a:solidFill>
+                <a:latin typeface="+mn-lt"/>
+                <a:ea typeface="+mn-ea"/>
+                <a:cs typeface="+mn-cs"/>
+              </a:defRPr>
+            </a:lvl8pPr>
+            <a:lvl9pPr marL="3886200" indent="-228600" algn="l" defTabSz="914400" rtl="0" eaLnBrk="1" latinLnBrk="0" hangingPunct="1">
+              <a:lnSpc>
+                <a:spcPct val="90000"/>
+              </a:lnSpc>
+              <a:spcBef>
+                <a:spcPts val="500"/>
+              </a:spcBef>
+              <a:buFont typeface="Arial" panose="020B0604020202020204" pitchFamily="34" charset="0"/>
+              <a:buChar char="•"/>
+              <a:defRPr sz="1800" kern="1200">
+                <a:solidFill>
+                  <a:schemeClr val="tx1"/>
+                </a:solidFill>
+                <a:latin typeface="+mn-lt"/>
+                <a:ea typeface="+mn-ea"/>
+                <a:cs typeface="+mn-cs"/>
+              </a:defRPr>
+            </a:lvl9pPr>
+          </a:lstStyle>
+          <a:p>
+            <a:pPr algn="r"/>
+            <a:endParaRPr lang="en-US" altLang="zh-CN" dirty="0">
+              <a:solidFill>
+                <a:srgbClr val="704F95"/>
+              </a:solidFill>
+              <a:latin typeface="思源宋体 Medium" panose="02020500000000000000" pitchFamily="18" charset="-122"/>
+              <a:ea typeface="思源宋体 Medium" panose="02020500000000000000" pitchFamily="18" charset="-122"/>
+            </a:endParaRPr>
+          </a:p>
+        </p:txBody>
+      </p:sp>
+      <p:sp>
+        <p:nvSpPr>
+          <p:cNvPr id="6" name="Content Placeholder 2"/>
+          <p:cNvSpPr txBox="1"/>
+          <p:nvPr/>
+        </p:nvSpPr>
+        <p:spPr>
+          <a:xfrm>
+            <a:off x="569776" y="1758737"/>
+            <a:ext cx="10515600" cy="4351338"/>
+          </a:xfrm>
+          <a:prstGeom prst="rect">
+            <a:avLst/>
+          </a:prstGeom>
+        </p:spPr>
+        <p:txBody>
+          <a:bodyPr>
+            <a:normAutofit/>
+          </a:bodyPr>
+          <a:lstStyle>
+            <a:lvl1pPr marL="228600" indent="-228600" algn="l" defTabSz="914400" rtl="0" eaLnBrk="1" latinLnBrk="0" hangingPunct="1">
+              <a:lnSpc>
+                <a:spcPct val="90000"/>
+              </a:lnSpc>
+              <a:spcBef>
+                <a:spcPts val="1000"/>
+              </a:spcBef>
+              <a:buFont typeface="Arial" panose="020B0604020202020204" pitchFamily="34" charset="0"/>
+              <a:buChar char="•"/>
+              <a:defRPr sz="2800" kern="1200">
+                <a:solidFill>
+                  <a:schemeClr val="tx1"/>
+                </a:solidFill>
+                <a:latin typeface="+mn-lt"/>
+                <a:ea typeface="+mn-ea"/>
+                <a:cs typeface="+mn-cs"/>
+              </a:defRPr>
+            </a:lvl1pPr>
+            <a:lvl2pPr marL="685800" indent="-228600" algn="l" defTabSz="914400" rtl="0" eaLnBrk="1" latinLnBrk="0" hangingPunct="1">
+              <a:lnSpc>
+                <a:spcPct val="90000"/>
+              </a:lnSpc>
+              <a:spcBef>
+                <a:spcPts val="500"/>
+              </a:spcBef>
+              <a:buFont typeface="Arial" panose="020B0604020202020204" pitchFamily="34" charset="0"/>
+              <a:buChar char="•"/>
+              <a:defRPr sz="2400" kern="1200">
+                <a:solidFill>
+                  <a:schemeClr val="tx1"/>
+                </a:solidFill>
+                <a:latin typeface="+mn-lt"/>
+                <a:ea typeface="+mn-ea"/>
+                <a:cs typeface="+mn-cs"/>
+              </a:defRPr>
+            </a:lvl2pPr>
+            <a:lvl3pPr marL="1143000" indent="-228600" algn="l" defTabSz="914400" rtl="0" eaLnBrk="1" latinLnBrk="0" hangingPunct="1">
+              <a:lnSpc>
+                <a:spcPct val="90000"/>
+              </a:lnSpc>
+              <a:spcBef>
+                <a:spcPts val="500"/>
+              </a:spcBef>
+              <a:buFont typeface="Arial" panose="020B0604020202020204" pitchFamily="34" charset="0"/>
+              <a:buChar char="•"/>
+              <a:defRPr sz="2000" kern="1200">
+                <a:solidFill>
+                  <a:schemeClr val="tx1"/>
+                </a:solidFill>
+                <a:latin typeface="+mn-lt"/>
+                <a:ea typeface="+mn-ea"/>
+                <a:cs typeface="+mn-cs"/>
+              </a:defRPr>
+            </a:lvl3pPr>
+            <a:lvl4pPr marL="1600200" indent="-228600" algn="l" defTabSz="914400" rtl="0" eaLnBrk="1" latinLnBrk="0" hangingPunct="1">
+              <a:lnSpc>
+                <a:spcPct val="90000"/>
+              </a:lnSpc>
+              <a:spcBef>
+                <a:spcPts val="500"/>
+              </a:spcBef>
+              <a:buFont typeface="Arial" panose="020B0604020202020204" pitchFamily="34" charset="0"/>
+              <a:buChar char="•"/>
+              <a:defRPr sz="1800" kern="1200">
+                <a:solidFill>
+                  <a:schemeClr val="tx1"/>
+                </a:solidFill>
+                <a:latin typeface="+mn-lt"/>
+                <a:ea typeface="+mn-ea"/>
+                <a:cs typeface="+mn-cs"/>
+              </a:defRPr>
+            </a:lvl4pPr>
+            <a:lvl5pPr marL="2057400" indent="-228600" algn="l" defTabSz="914400" rtl="0" eaLnBrk="1" latinLnBrk="0" hangingPunct="1">
+              <a:lnSpc>
+                <a:spcPct val="90000"/>
+              </a:lnSpc>
+              <a:spcBef>
+                <a:spcPts val="500"/>
+              </a:spcBef>
+              <a:buFont typeface="Arial" panose="020B0604020202020204" pitchFamily="34" charset="0"/>
+              <a:buChar char="•"/>
+              <a:defRPr sz="1800" kern="1200">
+                <a:solidFill>
+                  <a:schemeClr val="tx1"/>
+                </a:solidFill>
+                <a:latin typeface="+mn-lt"/>
+                <a:ea typeface="+mn-ea"/>
+                <a:cs typeface="+mn-cs"/>
+              </a:defRPr>
+            </a:lvl5pPr>
+            <a:lvl6pPr marL="2514600" indent="-228600" algn="l" defTabSz="914400" rtl="0" eaLnBrk="1" latinLnBrk="0" hangingPunct="1">
+              <a:lnSpc>
+                <a:spcPct val="90000"/>
+              </a:lnSpc>
+              <a:spcBef>
+                <a:spcPts val="500"/>
+              </a:spcBef>
+              <a:buFont typeface="Arial" panose="020B0604020202020204" pitchFamily="34" charset="0"/>
+              <a:buChar char="•"/>
+              <a:defRPr sz="1800" kern="1200">
+                <a:solidFill>
+                  <a:schemeClr val="tx1"/>
+                </a:solidFill>
+                <a:latin typeface="+mn-lt"/>
+                <a:ea typeface="+mn-ea"/>
+                <a:cs typeface="+mn-cs"/>
+              </a:defRPr>
+            </a:lvl6pPr>
+            <a:lvl7pPr marL="2971800" indent="-228600" algn="l" defTabSz="914400" rtl="0" eaLnBrk="1" latinLnBrk="0" hangingPunct="1">
+              <a:lnSpc>
+                <a:spcPct val="90000"/>
+              </a:lnSpc>
+              <a:spcBef>
+                <a:spcPts val="500"/>
+              </a:spcBef>
+              <a:buFont typeface="Arial" panose="020B0604020202020204" pitchFamily="34" charset="0"/>
+              <a:buChar char="•"/>
+              <a:defRPr sz="1800" kern="1200">
+                <a:solidFill>
+                  <a:schemeClr val="tx1"/>
+                </a:solidFill>
+                <a:latin typeface="+mn-lt"/>
+                <a:ea typeface="+mn-ea"/>
+                <a:cs typeface="+mn-cs"/>
+              </a:defRPr>
+            </a:lvl7pPr>
+            <a:lvl8pPr marL="3429000" indent="-228600" algn="l" defTabSz="914400" rtl="0" eaLnBrk="1" latinLnBrk="0" hangingPunct="1">
+              <a:lnSpc>
+                <a:spcPct val="90000"/>
+              </a:lnSpc>
+              <a:spcBef>
+                <a:spcPts val="500"/>
+              </a:spcBef>
+              <a:buFont typeface="Arial" panose="020B0604020202020204" pitchFamily="34" charset="0"/>
+              <a:buChar char="•"/>
+              <a:defRPr sz="1800" kern="1200">
+                <a:solidFill>
+                  <a:schemeClr val="tx1"/>
+                </a:solidFill>
+                <a:latin typeface="+mn-lt"/>
+                <a:ea typeface="+mn-ea"/>
+                <a:cs typeface="+mn-cs"/>
+              </a:defRPr>
+            </a:lvl8pPr>
+            <a:lvl9pPr marL="3886200" indent="-228600" algn="l" defTabSz="914400" rtl="0" eaLnBrk="1" latinLnBrk="0" hangingPunct="1">
+              <a:lnSpc>
+                <a:spcPct val="90000"/>
+              </a:lnSpc>
+              <a:spcBef>
+                <a:spcPts val="500"/>
+              </a:spcBef>
+              <a:buFont typeface="Arial" panose="020B0604020202020204" pitchFamily="34" charset="0"/>
+              <a:buChar char="•"/>
+              <a:defRPr sz="1800" kern="1200">
+                <a:solidFill>
+                  <a:schemeClr val="tx1"/>
+                </a:solidFill>
+                <a:latin typeface="+mn-lt"/>
+                <a:ea typeface="+mn-ea"/>
+                <a:cs typeface="+mn-cs"/>
+              </a:defRPr>
+            </a:lvl9pPr>
+          </a:lstStyle>
+          <a:p>
+            <a:r>
+              <a:rPr lang="zh-CN" dirty="0">
+                <a:latin typeface="+mn-ea"/>
+              </a:rPr>
+              <a:t>推测原因是“直接发中断”失效</a:t>
+            </a:r>
+            <a:endParaRPr lang="zh-CN" dirty="0">
+              <a:latin typeface="+mn-ea"/>
+            </a:endParaRPr>
+          </a:p>
+          <a:p>
+            <a:r>
+              <a:rPr lang="zh-CN" dirty="0">
+                <a:latin typeface="+mn-ea"/>
+              </a:rPr>
+              <a:t>退化到</a:t>
+            </a:r>
+            <a:r>
+              <a:rPr lang="en-US" altLang="zh-CN" dirty="0">
+                <a:latin typeface="+mn-ea"/>
+              </a:rPr>
+              <a:t> os </a:t>
+            </a:r>
+            <a:r>
+              <a:rPr lang="zh-CN" altLang="en-US" dirty="0">
+                <a:latin typeface="+mn-ea"/>
+              </a:rPr>
+              <a:t>调度时才处理用户态中断</a:t>
+            </a:r>
+            <a:endParaRPr lang="zh-CN" altLang="en-US" dirty="0">
+              <a:latin typeface="+mn-ea"/>
+            </a:endParaRPr>
+          </a:p>
+          <a:p>
+            <a:r>
+              <a:rPr lang="zh-CN" altLang="en-US" dirty="0">
+                <a:latin typeface="+mn-ea"/>
+              </a:rPr>
+              <a:t>在</a:t>
+            </a:r>
+            <a:r>
+              <a:rPr lang="en-US" altLang="zh-CN" dirty="0">
+                <a:latin typeface="+mn-ea"/>
+              </a:rPr>
+              <a:t> kernel </a:t>
+            </a:r>
+            <a:r>
+              <a:rPr lang="zh-CN" altLang="en-US" dirty="0">
+                <a:latin typeface="+mn-ea"/>
+              </a:rPr>
+              <a:t>中插入</a:t>
+            </a:r>
+            <a:r>
+              <a:rPr lang="en-US" altLang="zh-CN" dirty="0">
+                <a:latin typeface="+mn-ea"/>
+              </a:rPr>
+              <a:t> printk </a:t>
+            </a:r>
+            <a:r>
+              <a:rPr lang="zh-CN" altLang="en-US" dirty="0">
+                <a:latin typeface="+mn-ea"/>
+              </a:rPr>
+              <a:t>语句验证猜想</a:t>
+            </a:r>
+            <a:endParaRPr lang="zh-CN" altLang="en-US" dirty="0">
+              <a:latin typeface="+mn-ea"/>
+            </a:endParaRPr>
+          </a:p>
+          <a:p>
+            <a:endParaRPr lang="zh-CN" altLang="en-US" dirty="0">
+              <a:latin typeface="+mn-ea"/>
+            </a:endParaRPr>
+          </a:p>
+          <a:p>
+            <a:r>
+              <a:rPr lang="zh-CN" altLang="en-US" dirty="0">
+                <a:latin typeface="+mn-ea"/>
+              </a:rPr>
+              <a:t>可能是线程间竞争导致直接发中断失效</a:t>
+            </a:r>
+            <a:endParaRPr lang="zh-CN" altLang="en-US" dirty="0">
+              <a:latin typeface="+mn-ea"/>
+            </a:endParaRPr>
+          </a:p>
+          <a:p>
+            <a:r>
+              <a:rPr lang="zh-CN" altLang="en-US" dirty="0">
+                <a:latin typeface="+mn-ea"/>
+              </a:rPr>
+              <a:t>为后续优化提供了切入点</a:t>
+            </a:r>
+            <a:endParaRPr lang="zh-CN" altLang="en-US" dirty="0">
+              <a:latin typeface="+mn-ea"/>
+            </a:endParaRPr>
+          </a:p>
+        </p:txBody>
+      </p:sp>
+      <p:pic>
+        <p:nvPicPr>
+          <p:cNvPr id="2" name="图片 1" descr="Screenshot_20220603_231735"/>
           <p:cNvPicPr>
             <a:picLocks noChangeAspect="1"/>
           </p:cNvPicPr>
           <p:nvPr/>
         </p:nvPicPr>
         <p:blipFill>
-          <a:blip r:embed="rId4" cstate="print">
-            <a:extLst>
-              <a:ext uri="{28A0092B-C50C-407E-A947-70E740481C1C}">
-                <a14:useLocalDpi xmlns:a14="http://schemas.microsoft.com/office/drawing/2010/main" val="0"/>
-              </a:ext>
-            </a:extLst>
-          </a:blip>
-          <a:srcRect/>
+          <a:blip r:embed="rId2"/>
           <a:stretch>
             <a:fillRect/>
           </a:stretch>
         </p:blipFill>
-        <p:spPr bwMode="auto">
+        <p:spPr>
           <a:xfrm>
-            <a:off x="1330234" y="308691"/>
-            <a:ext cx="1073156" cy="1086219"/>
+            <a:off x="7426960" y="0"/>
+            <a:ext cx="4765040" cy="6858000"/>
           </a:xfrm>
           <a:prstGeom prst="rect">
             <a:avLst/>
           </a:prstGeom>
-          <a:noFill/>
-          <a:ln>
-            <a:noFill/>
-          </a:ln>
-          <a:extLst>
-            <a:ext uri="{909E8E84-426E-40DD-AFC4-6F175D3DCCD1}">
-              <a14:hiddenFill xmlns:a14="http://schemas.microsoft.com/office/drawing/2010/main">
-                <a:solidFill>
-                  <a:srgbClr val="FFFFFF"/>
-                </a:solidFill>
-              </a14:hiddenFill>
-            </a:ext>
-            <a:ext uri="{91240B29-F687-4F45-9708-019B960494DF}">
-              <a14:hiddenLine xmlns:a14="http://schemas.microsoft.com/office/drawing/2010/main" w="9525">
-                <a:solidFill>
-                  <a:srgbClr val="000000"/>
-                </a:solidFill>
-                <a:miter lim="800000"/>
-                <a:headEnd/>
-                <a:tailEnd/>
-              </a14:hiddenLine>
-            </a:ext>
-          </a:extLst>
         </p:spPr>
       </p:pic>
     </p:spTree>
@@ -8568,8 +10816,6 @@
       </a:bgFillStyleLst>
     </a:fmtScheme>
   </a:themeElements>
-  <a:objectDefaults/>
-  <a:extraClrSchemeLst/>
   <a:extLst>
     <a:ext uri="{05A4C25C-085E-4340-85A3-A5531E510DB2}">
       <thm15:themeFamily xmlns:thm15="http://schemas.microsoft.com/office/thememl/2012/main" name="Office Theme" id="{62F939B6-93AF-4DB8-9C6B-D6C7DFDC589F}" vid="{4A3C46E8-61CC-4603-A589-7422A47A8E4A}"/>
@@ -8829,8 +11075,6 @@
       </a:bgFillStyleLst>
     </a:fmtScheme>
   </a:themeElements>
-  <a:objectDefaults/>
-  <a:extraClrSchemeLst/>
   <a:extLst>
     <a:ext uri="{05A4C25C-085E-4340-85A3-A5531E510DB2}">
       <thm15:themeFamily xmlns:thm15="http://schemas.microsoft.com/office/thememl/2012/main" name="Office Theme" id="{62F939B6-93AF-4DB8-9C6B-D6C7DFDC589F}" vid="{4A3C46E8-61CC-4603-A589-7422A47A8E4A}"/>

</xml_diff>